<commit_message>
Change label from Task to Phase for pie chart, finish presentation, remove separate data frames for active, inactive and upcoming projects
</commit_message>
<xml_diff>
--- a/RLadies timetrackR Presentation.pptx
+++ b/RLadies timetrackR Presentation.pptx
@@ -5,7 +5,7 @@
     <p:sldMasterId id="2147483648" r:id="rId4"/>
   </p:sldMasterIdLst>
   <p:notesMasterIdLst>
-    <p:notesMasterId r:id="rId35"/>
+    <p:notesMasterId r:id="rId42"/>
   </p:notesMasterIdLst>
   <p:sldIdLst>
     <p:sldId id="256" r:id="rId5"/>
@@ -21,23 +21,30 @@
     <p:sldId id="259" r:id="rId15"/>
     <p:sldId id="276" r:id="rId16"/>
     <p:sldId id="281" r:id="rId17"/>
-    <p:sldId id="282" r:id="rId18"/>
-    <p:sldId id="283" r:id="rId19"/>
-    <p:sldId id="266" r:id="rId20"/>
-    <p:sldId id="286" r:id="rId21"/>
-    <p:sldId id="274" r:id="rId22"/>
-    <p:sldId id="292" r:id="rId23"/>
-    <p:sldId id="293" r:id="rId24"/>
-    <p:sldId id="284" r:id="rId25"/>
-    <p:sldId id="285" r:id="rId26"/>
-    <p:sldId id="289" r:id="rId27"/>
-    <p:sldId id="294" r:id="rId28"/>
-    <p:sldId id="288" r:id="rId29"/>
-    <p:sldId id="295" r:id="rId30"/>
-    <p:sldId id="262" r:id="rId31"/>
-    <p:sldId id="263" r:id="rId32"/>
-    <p:sldId id="280" r:id="rId33"/>
-    <p:sldId id="273" r:id="rId34"/>
+    <p:sldId id="296" r:id="rId18"/>
+    <p:sldId id="282" r:id="rId19"/>
+    <p:sldId id="298" r:id="rId20"/>
+    <p:sldId id="299" r:id="rId21"/>
+    <p:sldId id="283" r:id="rId22"/>
+    <p:sldId id="297" r:id="rId23"/>
+    <p:sldId id="300" r:id="rId24"/>
+    <p:sldId id="266" r:id="rId25"/>
+    <p:sldId id="286" r:id="rId26"/>
+    <p:sldId id="274" r:id="rId27"/>
+    <p:sldId id="292" r:id="rId28"/>
+    <p:sldId id="293" r:id="rId29"/>
+    <p:sldId id="284" r:id="rId30"/>
+    <p:sldId id="285" r:id="rId31"/>
+    <p:sldId id="302" r:id="rId32"/>
+    <p:sldId id="289" r:id="rId33"/>
+    <p:sldId id="294" r:id="rId34"/>
+    <p:sldId id="288" r:id="rId35"/>
+    <p:sldId id="295" r:id="rId36"/>
+    <p:sldId id="301" r:id="rId37"/>
+    <p:sldId id="262" r:id="rId38"/>
+    <p:sldId id="280" r:id="rId39"/>
+    <p:sldId id="263" r:id="rId40"/>
+    <p:sldId id="273" r:id="rId41"/>
   </p:sldIdLst>
   <p:sldSz cx="9144000" cy="6858000" type="screen4x3"/>
   <p:notesSz cx="6858000" cy="9144000"/>
@@ -2815,7 +2822,7 @@
           <a:p>
             <a:fld id="{7F6DE0E8-87C7-4A14-9F3C-CD4E49706B18}" type="datetimeFigureOut">
               <a:rPr lang="en-US" smtClean="0"/>
-              <a:t>2/19/2020</a:t>
+              <a:t>2/21/2020</a:t>
             </a:fld>
             <a:endParaRPr lang="en-US"/>
           </a:p>
@@ -3344,7 +3351,7 @@
           <a:p>
             <a:fld id="{9C5C8B17-D1C9-48DD-A1B1-EDA1E362804A}" type="slidenum">
               <a:rPr lang="en-US" smtClean="0"/>
-              <a:t>15</a:t>
+              <a:t>18</a:t>
             </a:fld>
             <a:endParaRPr lang="en-US"/>
           </a:p>
@@ -6625,11 +6632,19 @@
           <a:lstStyle/>
           <a:p>
             <a:r>
-              <a:rPr lang="en-US" i="1" dirty="0" err="1"/>
+              <a:rPr lang="en-US" i="1" dirty="0" err="1">
+                <a:solidFill>
+                  <a:schemeClr val="accent2"/>
+                </a:solidFill>
+              </a:rPr>
               <a:t>timetrackR</a:t>
             </a:r>
             <a:r>
-              <a:rPr lang="en-US" dirty="0"/>
+              <a:rPr lang="en-US" dirty="0">
+                <a:solidFill>
+                  <a:schemeClr val="accent2"/>
+                </a:solidFill>
+              </a:rPr>
               <a:t> Demo</a:t>
             </a:r>
           </a:p>
@@ -6825,7 +6840,7 @@
 </file>
 
 <file path=ppt/slides/slide14.xml><?xml version="1.0" encoding="utf-8"?>
-<p:sld xmlns:a="http://schemas.openxmlformats.org/drawingml/2006/main" xmlns:r="http://schemas.openxmlformats.org/officeDocument/2006/relationships" xmlns:p="http://schemas.openxmlformats.org/presentationml/2006/main" show="0">
+<p:sld xmlns:a="http://schemas.openxmlformats.org/drawingml/2006/main" xmlns:r="http://schemas.openxmlformats.org/officeDocument/2006/relationships" xmlns:p="http://schemas.openxmlformats.org/presentationml/2006/main">
   <p:cSld>
     <p:spTree>
       <p:nvGrpSpPr>
@@ -6841,40 +6856,12 @@
           <a:chExt cx="0" cy="0"/>
         </a:xfrm>
       </p:grpSpPr>
-      <p:sp>
-        <p:nvSpPr>
-          <p:cNvPr id="2" name="Title 1">
-            <a:extLst>
-              <a:ext uri="{FF2B5EF4-FFF2-40B4-BE49-F238E27FC236}">
-                <a16:creationId xmlns:a16="http://schemas.microsoft.com/office/drawing/2014/main" id="{10C7E46A-DBEC-41C4-92DD-EA5D6845472B}"/>
-              </a:ext>
-            </a:extLst>
-          </p:cNvPr>
-          <p:cNvSpPr>
-            <a:spLocks noGrp="1"/>
-          </p:cNvSpPr>
-          <p:nvPr>
-            <p:ph type="title"/>
-          </p:nvPr>
-        </p:nvSpPr>
-        <p:spPr/>
-        <p:txBody>
-          <a:bodyPr/>
-          <a:lstStyle/>
-          <a:p>
-            <a:r>
-              <a:rPr lang="en-US" dirty="0"/>
-              <a:t>Backup Screenshots</a:t>
-            </a:r>
-          </a:p>
-        </p:txBody>
-      </p:sp>
       <p:pic>
         <p:nvPicPr>
           <p:cNvPr id="3" name="Picture 2">
             <a:extLst>
               <a:ext uri="{FF2B5EF4-FFF2-40B4-BE49-F238E27FC236}">
-                <a16:creationId xmlns:a16="http://schemas.microsoft.com/office/drawing/2014/main" id="{CB4CF9F4-46F6-4400-8D08-3C66633BFDAB}"/>
+                <a16:creationId xmlns:a16="http://schemas.microsoft.com/office/drawing/2014/main" id="{14F6AA2F-2A7B-4C81-9914-89A9677AC177}"/>
               </a:ext>
             </a:extLst>
           </p:cNvPr>
@@ -6891,8 +6878,8 @@
         </p:blipFill>
         <p:spPr>
           <a:xfrm>
-            <a:off x="1501278" y="1235170"/>
-            <a:ext cx="7204066" cy="5622830"/>
+            <a:off x="0" y="1106555"/>
+            <a:ext cx="9144000" cy="3622913"/>
           </a:xfrm>
           <a:prstGeom prst="rect">
             <a:avLst/>
@@ -6902,7 +6889,7 @@
     </p:spTree>
     <p:extLst>
       <p:ext uri="{BB962C8B-B14F-4D97-AF65-F5344CB8AC3E}">
-        <p14:creationId xmlns:p14="http://schemas.microsoft.com/office/powerpoint/2010/main" val="810443589"/>
+        <p14:creationId xmlns:p14="http://schemas.microsoft.com/office/powerpoint/2010/main" val="2416325315"/>
       </p:ext>
     </p:extLst>
   </p:cSld>
@@ -6959,6 +6946,214 @@
       </p:sp>
       <p:pic>
         <p:nvPicPr>
+          <p:cNvPr id="3" name="Picture 2">
+            <a:extLst>
+              <a:ext uri="{FF2B5EF4-FFF2-40B4-BE49-F238E27FC236}">
+                <a16:creationId xmlns:a16="http://schemas.microsoft.com/office/drawing/2014/main" id="{CB4CF9F4-46F6-4400-8D08-3C66633BFDAB}"/>
+              </a:ext>
+            </a:extLst>
+          </p:cNvPr>
+          <p:cNvPicPr>
+            <a:picLocks noChangeAspect="1"/>
+          </p:cNvPicPr>
+          <p:nvPr/>
+        </p:nvPicPr>
+        <p:blipFill>
+          <a:blip r:embed="rId2"/>
+          <a:stretch>
+            <a:fillRect/>
+          </a:stretch>
+        </p:blipFill>
+        <p:spPr>
+          <a:xfrm>
+            <a:off x="1501278" y="1235170"/>
+            <a:ext cx="7204066" cy="5622830"/>
+          </a:xfrm>
+          <a:prstGeom prst="rect">
+            <a:avLst/>
+          </a:prstGeom>
+        </p:spPr>
+      </p:pic>
+    </p:spTree>
+    <p:extLst>
+      <p:ext uri="{BB962C8B-B14F-4D97-AF65-F5344CB8AC3E}">
+        <p14:creationId xmlns:p14="http://schemas.microsoft.com/office/powerpoint/2010/main" val="810443589"/>
+      </p:ext>
+    </p:extLst>
+  </p:cSld>
+  <p:clrMapOvr>
+    <a:masterClrMapping/>
+  </p:clrMapOvr>
+</p:sld>
+</file>
+
+<file path=ppt/slides/slide16.xml><?xml version="1.0" encoding="utf-8"?>
+<p:sld xmlns:a="http://schemas.openxmlformats.org/drawingml/2006/main" xmlns:r="http://schemas.openxmlformats.org/officeDocument/2006/relationships" xmlns:p="http://schemas.openxmlformats.org/presentationml/2006/main">
+  <p:cSld>
+    <p:spTree>
+      <p:nvGrpSpPr>
+        <p:cNvPr id="1" name=""/>
+        <p:cNvGrpSpPr/>
+        <p:nvPr/>
+      </p:nvGrpSpPr>
+      <p:grpSpPr>
+        <a:xfrm>
+          <a:off x="0" y="0"/>
+          <a:ext cx="0" cy="0"/>
+          <a:chOff x="0" y="0"/>
+          <a:chExt cx="0" cy="0"/>
+        </a:xfrm>
+      </p:grpSpPr>
+      <p:pic>
+        <p:nvPicPr>
+          <p:cNvPr id="2" name="Picture 1">
+            <a:extLst>
+              <a:ext uri="{FF2B5EF4-FFF2-40B4-BE49-F238E27FC236}">
+                <a16:creationId xmlns:a16="http://schemas.microsoft.com/office/drawing/2014/main" id="{75DF7FCC-27AA-4F60-9F80-5B47103FFFC7}"/>
+              </a:ext>
+            </a:extLst>
+          </p:cNvPr>
+          <p:cNvPicPr>
+            <a:picLocks noChangeAspect="1"/>
+          </p:cNvPicPr>
+          <p:nvPr/>
+        </p:nvPicPr>
+        <p:blipFill>
+          <a:blip r:embed="rId2"/>
+          <a:stretch>
+            <a:fillRect/>
+          </a:stretch>
+        </p:blipFill>
+        <p:spPr>
+          <a:xfrm>
+            <a:off x="0" y="1385729"/>
+            <a:ext cx="9144000" cy="4086542"/>
+          </a:xfrm>
+          <a:prstGeom prst="rect">
+            <a:avLst/>
+          </a:prstGeom>
+        </p:spPr>
+      </p:pic>
+    </p:spTree>
+    <p:extLst>
+      <p:ext uri="{BB962C8B-B14F-4D97-AF65-F5344CB8AC3E}">
+        <p14:creationId xmlns:p14="http://schemas.microsoft.com/office/powerpoint/2010/main" val="3103135274"/>
+      </p:ext>
+    </p:extLst>
+  </p:cSld>
+  <p:clrMapOvr>
+    <a:masterClrMapping/>
+  </p:clrMapOvr>
+</p:sld>
+</file>
+
+<file path=ppt/slides/slide17.xml><?xml version="1.0" encoding="utf-8"?>
+<p:sld xmlns:a="http://schemas.openxmlformats.org/drawingml/2006/main" xmlns:r="http://schemas.openxmlformats.org/officeDocument/2006/relationships" xmlns:p="http://schemas.openxmlformats.org/presentationml/2006/main">
+  <p:cSld>
+    <p:spTree>
+      <p:nvGrpSpPr>
+        <p:cNvPr id="1" name=""/>
+        <p:cNvGrpSpPr/>
+        <p:nvPr/>
+      </p:nvGrpSpPr>
+      <p:grpSpPr>
+        <a:xfrm>
+          <a:off x="0" y="0"/>
+          <a:ext cx="0" cy="0"/>
+          <a:chOff x="0" y="0"/>
+          <a:chExt cx="0" cy="0"/>
+        </a:xfrm>
+      </p:grpSpPr>
+      <p:pic>
+        <p:nvPicPr>
+          <p:cNvPr id="2" name="Picture 1">
+            <a:extLst>
+              <a:ext uri="{FF2B5EF4-FFF2-40B4-BE49-F238E27FC236}">
+                <a16:creationId xmlns:a16="http://schemas.microsoft.com/office/drawing/2014/main" id="{D7A1B5BD-4AEB-4C6B-A79A-B5CD822F1EDB}"/>
+              </a:ext>
+            </a:extLst>
+          </p:cNvPr>
+          <p:cNvPicPr>
+            <a:picLocks noChangeAspect="1"/>
+          </p:cNvPicPr>
+          <p:nvPr/>
+        </p:nvPicPr>
+        <p:blipFill>
+          <a:blip r:embed="rId2"/>
+          <a:stretch>
+            <a:fillRect/>
+          </a:stretch>
+        </p:blipFill>
+        <p:spPr>
+          <a:xfrm>
+            <a:off x="0" y="588007"/>
+            <a:ext cx="9144000" cy="5681986"/>
+          </a:xfrm>
+          <a:prstGeom prst="rect">
+            <a:avLst/>
+          </a:prstGeom>
+        </p:spPr>
+      </p:pic>
+    </p:spTree>
+    <p:extLst>
+      <p:ext uri="{BB962C8B-B14F-4D97-AF65-F5344CB8AC3E}">
+        <p14:creationId xmlns:p14="http://schemas.microsoft.com/office/powerpoint/2010/main" val="2911774848"/>
+      </p:ext>
+    </p:extLst>
+  </p:cSld>
+  <p:clrMapOvr>
+    <a:masterClrMapping/>
+  </p:clrMapOvr>
+</p:sld>
+</file>
+
+<file path=ppt/slides/slide18.xml><?xml version="1.0" encoding="utf-8"?>
+<p:sld xmlns:a="http://schemas.openxmlformats.org/drawingml/2006/main" xmlns:r="http://schemas.openxmlformats.org/officeDocument/2006/relationships" xmlns:p="http://schemas.openxmlformats.org/presentationml/2006/main" show="0">
+  <p:cSld>
+    <p:spTree>
+      <p:nvGrpSpPr>
+        <p:cNvPr id="1" name=""/>
+        <p:cNvGrpSpPr/>
+        <p:nvPr/>
+      </p:nvGrpSpPr>
+      <p:grpSpPr>
+        <a:xfrm>
+          <a:off x="0" y="0"/>
+          <a:ext cx="0" cy="0"/>
+          <a:chOff x="0" y="0"/>
+          <a:chExt cx="0" cy="0"/>
+        </a:xfrm>
+      </p:grpSpPr>
+      <p:sp>
+        <p:nvSpPr>
+          <p:cNvPr id="2" name="Title 1">
+            <a:extLst>
+              <a:ext uri="{FF2B5EF4-FFF2-40B4-BE49-F238E27FC236}">
+                <a16:creationId xmlns:a16="http://schemas.microsoft.com/office/drawing/2014/main" id="{10C7E46A-DBEC-41C4-92DD-EA5D6845472B}"/>
+              </a:ext>
+            </a:extLst>
+          </p:cNvPr>
+          <p:cNvSpPr>
+            <a:spLocks noGrp="1"/>
+          </p:cNvSpPr>
+          <p:nvPr>
+            <p:ph type="title"/>
+          </p:nvPr>
+        </p:nvSpPr>
+        <p:spPr/>
+        <p:txBody>
+          <a:bodyPr/>
+          <a:lstStyle/>
+          <a:p>
+            <a:r>
+              <a:rPr lang="en-US" dirty="0"/>
+              <a:t>Backup Screenshots</a:t>
+            </a:r>
+          </a:p>
+        </p:txBody>
+      </p:sp>
+      <p:pic>
+        <p:nvPicPr>
           <p:cNvPr id="4" name="Picture 3">
             <a:extLst>
               <a:ext uri="{FF2B5EF4-FFF2-40B4-BE49-F238E27FC236}">
@@ -7000,7 +7195,324 @@
 </p:sld>
 </file>
 
-<file path=ppt/slides/slide16.xml><?xml version="1.0" encoding="utf-8"?>
+<file path=ppt/slides/slide19.xml><?xml version="1.0" encoding="utf-8"?>
+<p:sld xmlns:a="http://schemas.openxmlformats.org/drawingml/2006/main" xmlns:r="http://schemas.openxmlformats.org/officeDocument/2006/relationships" xmlns:p="http://schemas.openxmlformats.org/presentationml/2006/main">
+  <p:cSld>
+    <p:spTree>
+      <p:nvGrpSpPr>
+        <p:cNvPr id="1" name=""/>
+        <p:cNvGrpSpPr/>
+        <p:nvPr/>
+      </p:nvGrpSpPr>
+      <p:grpSpPr>
+        <a:xfrm>
+          <a:off x="0" y="0"/>
+          <a:ext cx="0" cy="0"/>
+          <a:chOff x="0" y="0"/>
+          <a:chExt cx="0" cy="0"/>
+        </a:xfrm>
+      </p:grpSpPr>
+      <p:pic>
+        <p:nvPicPr>
+          <p:cNvPr id="3" name="Picture 2">
+            <a:extLst>
+              <a:ext uri="{FF2B5EF4-FFF2-40B4-BE49-F238E27FC236}">
+                <a16:creationId xmlns:a16="http://schemas.microsoft.com/office/drawing/2014/main" id="{1BA8B82F-FC2F-4498-A99D-0052C04A2287}"/>
+              </a:ext>
+            </a:extLst>
+          </p:cNvPr>
+          <p:cNvPicPr>
+            <a:picLocks noChangeAspect="1"/>
+          </p:cNvPicPr>
+          <p:nvPr/>
+        </p:nvPicPr>
+        <p:blipFill>
+          <a:blip r:embed="rId2"/>
+          <a:stretch>
+            <a:fillRect/>
+          </a:stretch>
+        </p:blipFill>
+        <p:spPr>
+          <a:xfrm>
+            <a:off x="0" y="1501659"/>
+            <a:ext cx="9144000" cy="3854681"/>
+          </a:xfrm>
+          <a:prstGeom prst="rect">
+            <a:avLst/>
+          </a:prstGeom>
+        </p:spPr>
+      </p:pic>
+    </p:spTree>
+    <p:extLst>
+      <p:ext uri="{BB962C8B-B14F-4D97-AF65-F5344CB8AC3E}">
+        <p14:creationId xmlns:p14="http://schemas.microsoft.com/office/powerpoint/2010/main" val="694579036"/>
+      </p:ext>
+    </p:extLst>
+  </p:cSld>
+  <p:clrMapOvr>
+    <a:masterClrMapping/>
+  </p:clrMapOvr>
+</p:sld>
+</file>
+
+<file path=ppt/slides/slide2.xml><?xml version="1.0" encoding="utf-8"?>
+<p:sld xmlns:a="http://schemas.openxmlformats.org/drawingml/2006/main" xmlns:r="http://schemas.openxmlformats.org/officeDocument/2006/relationships" xmlns:p="http://schemas.openxmlformats.org/presentationml/2006/main">
+  <p:cSld>
+    <p:spTree>
+      <p:nvGrpSpPr>
+        <p:cNvPr id="1" name=""/>
+        <p:cNvGrpSpPr/>
+        <p:nvPr/>
+      </p:nvGrpSpPr>
+      <p:grpSpPr>
+        <a:xfrm>
+          <a:off x="0" y="0"/>
+          <a:ext cx="0" cy="0"/>
+          <a:chOff x="0" y="0"/>
+          <a:chExt cx="0" cy="0"/>
+        </a:xfrm>
+      </p:grpSpPr>
+      <p:sp>
+        <p:nvSpPr>
+          <p:cNvPr id="2" name="Title 1">
+            <a:extLst>
+              <a:ext uri="{FF2B5EF4-FFF2-40B4-BE49-F238E27FC236}">
+                <a16:creationId xmlns:a16="http://schemas.microsoft.com/office/drawing/2014/main" id="{8E20A4B1-CEFE-42F6-BE30-1CF39169F3F8}"/>
+              </a:ext>
+            </a:extLst>
+          </p:cNvPr>
+          <p:cNvSpPr>
+            <a:spLocks noGrp="1"/>
+          </p:cNvSpPr>
+          <p:nvPr>
+            <p:ph type="title"/>
+          </p:nvPr>
+        </p:nvSpPr>
+        <p:spPr/>
+        <p:txBody>
+          <a:bodyPr/>
+          <a:lstStyle/>
+          <a:p>
+            <a:r>
+              <a:rPr lang="en-US" dirty="0"/>
+              <a:t>Time &amp; the busy </a:t>
+            </a:r>
+            <a:r>
+              <a:rPr lang="en-US" dirty="0" err="1"/>
+              <a:t>RLady</a:t>
+            </a:r>
+            <a:endParaRPr lang="en-US" dirty="0"/>
+          </a:p>
+        </p:txBody>
+      </p:sp>
+      <p:sp>
+        <p:nvSpPr>
+          <p:cNvPr id="5" name="Content Placeholder 4">
+            <a:extLst>
+              <a:ext uri="{FF2B5EF4-FFF2-40B4-BE49-F238E27FC236}">
+                <a16:creationId xmlns:a16="http://schemas.microsoft.com/office/drawing/2014/main" id="{9C48C686-4E67-459C-8A8F-9A73F64F4E68}"/>
+              </a:ext>
+            </a:extLst>
+          </p:cNvPr>
+          <p:cNvSpPr>
+            <a:spLocks noGrp="1"/>
+          </p:cNvSpPr>
+          <p:nvPr>
+            <p:ph idx="1"/>
+          </p:nvPr>
+        </p:nvSpPr>
+        <p:spPr/>
+        <p:txBody>
+          <a:bodyPr/>
+          <a:lstStyle/>
+          <a:p>
+            <a:r>
+              <a:rPr lang="en-US" sz="2400" dirty="0"/>
+              <a:t>Often feels like there aren’t enough hours in the day</a:t>
+            </a:r>
+          </a:p>
+          <a:p>
+            <a:r>
+              <a:rPr lang="en-US" sz="2400" dirty="0"/>
+              <a:t>Start working on one project, check email, bounce to another project, maybe remember to go back to first project, and oh look! It’s 5pm</a:t>
+            </a:r>
+          </a:p>
+          <a:p>
+            <a:r>
+              <a:rPr lang="en-US" sz="2400" dirty="0"/>
+              <a:t>Long term: you have no recollection of how you’re spending your days</a:t>
+            </a:r>
+          </a:p>
+        </p:txBody>
+      </p:sp>
+      <p:pic>
+        <p:nvPicPr>
+          <p:cNvPr id="4098" name="Picture 2" descr="Image result for time management">
+            <a:extLst>
+              <a:ext uri="{FF2B5EF4-FFF2-40B4-BE49-F238E27FC236}">
+                <a16:creationId xmlns:a16="http://schemas.microsoft.com/office/drawing/2014/main" id="{F418449D-9875-4294-9A52-2986FF9D794A}"/>
+              </a:ext>
+            </a:extLst>
+          </p:cNvPr>
+          <p:cNvPicPr>
+            <a:picLocks noChangeAspect="1" noChangeArrowheads="1"/>
+          </p:cNvPicPr>
+          <p:nvPr/>
+        </p:nvPicPr>
+        <p:blipFill>
+          <a:blip r:embed="rId3">
+            <a:extLst>
+              <a:ext uri="{28A0092B-C50C-407E-A947-70E740481C1C}">
+                <a14:useLocalDpi xmlns:a14="http://schemas.microsoft.com/office/drawing/2010/main" val="0"/>
+              </a:ext>
+            </a:extLst>
+          </a:blip>
+          <a:srcRect/>
+          <a:stretch>
+            <a:fillRect/>
+          </a:stretch>
+        </p:blipFill>
+        <p:spPr bwMode="auto">
+          <a:xfrm>
+            <a:off x="965353" y="4071578"/>
+            <a:ext cx="3267075" cy="1400175"/>
+          </a:xfrm>
+          <a:prstGeom prst="rect">
+            <a:avLst/>
+          </a:prstGeom>
+          <a:noFill/>
+          <a:extLst>
+            <a:ext uri="{909E8E84-426E-40DD-AFC4-6F175D3DCCD1}">
+              <a14:hiddenFill xmlns:a14="http://schemas.microsoft.com/office/drawing/2010/main">
+                <a:solidFill>
+                  <a:srgbClr val="FFFFFF"/>
+                </a:solidFill>
+              </a14:hiddenFill>
+            </a:ext>
+          </a:extLst>
+        </p:spPr>
+      </p:pic>
+      <p:pic>
+        <p:nvPicPr>
+          <p:cNvPr id="4" name="Picture 2" descr="Image result for alice in wonderland rabbit time">
+            <a:extLst>
+              <a:ext uri="{FF2B5EF4-FFF2-40B4-BE49-F238E27FC236}">
+                <a16:creationId xmlns:a16="http://schemas.microsoft.com/office/drawing/2014/main" id="{6C594743-08C0-4041-A651-BC303D46531F}"/>
+              </a:ext>
+            </a:extLst>
+          </p:cNvPr>
+          <p:cNvPicPr>
+            <a:picLocks noChangeAspect="1" noChangeArrowheads="1"/>
+          </p:cNvPicPr>
+          <p:nvPr/>
+        </p:nvPicPr>
+        <p:blipFill>
+          <a:blip r:embed="rId4">
+            <a:extLst>
+              <a:ext uri="{28A0092B-C50C-407E-A947-70E740481C1C}">
+                <a14:useLocalDpi xmlns:a14="http://schemas.microsoft.com/office/drawing/2010/main" val="0"/>
+              </a:ext>
+            </a:extLst>
+          </a:blip>
+          <a:srcRect/>
+          <a:stretch>
+            <a:fillRect/>
+          </a:stretch>
+        </p:blipFill>
+        <p:spPr bwMode="auto">
+          <a:xfrm>
+            <a:off x="5382411" y="3814404"/>
+            <a:ext cx="2390775" cy="1914525"/>
+          </a:xfrm>
+          <a:prstGeom prst="rect">
+            <a:avLst/>
+          </a:prstGeom>
+          <a:noFill/>
+          <a:extLst>
+            <a:ext uri="{909E8E84-426E-40DD-AFC4-6F175D3DCCD1}">
+              <a14:hiddenFill xmlns:a14="http://schemas.microsoft.com/office/drawing/2010/main">
+                <a:solidFill>
+                  <a:srgbClr val="FFFFFF"/>
+                </a:solidFill>
+              </a14:hiddenFill>
+            </a:ext>
+          </a:extLst>
+        </p:spPr>
+      </p:pic>
+    </p:spTree>
+    <p:extLst>
+      <p:ext uri="{BB962C8B-B14F-4D97-AF65-F5344CB8AC3E}">
+        <p14:creationId xmlns:p14="http://schemas.microsoft.com/office/powerpoint/2010/main" val="2336468093"/>
+      </p:ext>
+    </p:extLst>
+  </p:cSld>
+  <p:clrMapOvr>
+    <a:masterClrMapping/>
+  </p:clrMapOvr>
+</p:sld>
+</file>
+
+<file path=ppt/slides/slide20.xml><?xml version="1.0" encoding="utf-8"?>
+<p:sld xmlns:a="http://schemas.openxmlformats.org/drawingml/2006/main" xmlns:r="http://schemas.openxmlformats.org/officeDocument/2006/relationships" xmlns:p="http://schemas.openxmlformats.org/presentationml/2006/main">
+  <p:cSld>
+    <p:spTree>
+      <p:nvGrpSpPr>
+        <p:cNvPr id="1" name=""/>
+        <p:cNvGrpSpPr/>
+        <p:nvPr/>
+      </p:nvGrpSpPr>
+      <p:grpSpPr>
+        <a:xfrm>
+          <a:off x="0" y="0"/>
+          <a:ext cx="0" cy="0"/>
+          <a:chOff x="0" y="0"/>
+          <a:chExt cx="0" cy="0"/>
+        </a:xfrm>
+      </p:grpSpPr>
+      <p:pic>
+        <p:nvPicPr>
+          <p:cNvPr id="2" name="Picture 1">
+            <a:extLst>
+              <a:ext uri="{FF2B5EF4-FFF2-40B4-BE49-F238E27FC236}">
+                <a16:creationId xmlns:a16="http://schemas.microsoft.com/office/drawing/2014/main" id="{0583C847-FD86-4F8F-8929-84C4087952B5}"/>
+              </a:ext>
+            </a:extLst>
+          </p:cNvPr>
+          <p:cNvPicPr>
+            <a:picLocks noChangeAspect="1"/>
+          </p:cNvPicPr>
+          <p:nvPr/>
+        </p:nvPicPr>
+        <p:blipFill>
+          <a:blip r:embed="rId2"/>
+          <a:stretch>
+            <a:fillRect/>
+          </a:stretch>
+        </p:blipFill>
+        <p:spPr>
+          <a:xfrm>
+            <a:off x="0" y="825649"/>
+            <a:ext cx="9144000" cy="5206701"/>
+          </a:xfrm>
+          <a:prstGeom prst="rect">
+            <a:avLst/>
+          </a:prstGeom>
+        </p:spPr>
+      </p:pic>
+    </p:spTree>
+    <p:extLst>
+      <p:ext uri="{BB962C8B-B14F-4D97-AF65-F5344CB8AC3E}">
+        <p14:creationId xmlns:p14="http://schemas.microsoft.com/office/powerpoint/2010/main" val="279152716"/>
+      </p:ext>
+    </p:extLst>
+  </p:cSld>
+  <p:clrMapOvr>
+    <a:masterClrMapping/>
+  </p:clrMapOvr>
+</p:sld>
+</file>
+
+<file path=ppt/slides/slide21.xml><?xml version="1.0" encoding="utf-8"?>
 <p:sld xmlns:a="http://schemas.openxmlformats.org/drawingml/2006/main" xmlns:r="http://schemas.openxmlformats.org/officeDocument/2006/relationships" xmlns:p="http://schemas.openxmlformats.org/presentationml/2006/main">
   <p:cSld>
     <p:spTree>
@@ -7130,7 +7642,7 @@
 </p:sld>
 </file>
 
-<file path=ppt/slides/slide17.xml><?xml version="1.0" encoding="utf-8"?>
+<file path=ppt/slides/slide22.xml><?xml version="1.0" encoding="utf-8"?>
 <p:sld xmlns:a="http://schemas.openxmlformats.org/drawingml/2006/main" xmlns:r="http://schemas.openxmlformats.org/officeDocument/2006/relationships" xmlns:p="http://schemas.openxmlformats.org/presentationml/2006/main">
   <p:cSld>
     <p:spTree>
@@ -7318,7 +7830,7 @@
 </p:sld>
 </file>
 
-<file path=ppt/slides/slide18.xml><?xml version="1.0" encoding="utf-8"?>
+<file path=ppt/slides/slide23.xml><?xml version="1.0" encoding="utf-8"?>
 <p:sld xmlns:a="http://schemas.openxmlformats.org/drawingml/2006/main" xmlns:r="http://schemas.openxmlformats.org/officeDocument/2006/relationships" xmlns:p="http://schemas.openxmlformats.org/presentationml/2006/main">
   <p:cSld>
     <p:spTree>
@@ -7385,28 +7897,28 @@
           <a:lstStyle/>
           <a:p>
             <a:r>
-              <a:rPr lang="en-US" dirty="0"/>
+              <a:rPr lang="en-US" sz="2800" dirty="0"/>
               <a:t>Fork the GitHub repo</a:t>
             </a:r>
           </a:p>
           <a:p>
             <a:pPr lvl="1"/>
             <a:r>
-              <a:rPr lang="en-US" dirty="0"/>
+              <a:rPr lang="en-US" sz="2400" dirty="0"/>
               <a:t>Includes a template time tracker and template project tracker tab</a:t>
             </a:r>
           </a:p>
           <a:p>
             <a:pPr lvl="1"/>
             <a:r>
-              <a:rPr lang="en-US" dirty="0"/>
+              <a:rPr lang="en-US" sz="2400" dirty="0"/>
               <a:t>Time tracker is where you log your hours</a:t>
             </a:r>
           </a:p>
           <a:p>
             <a:pPr lvl="1"/>
             <a:r>
-              <a:rPr lang="en-US" dirty="0"/>
+              <a:rPr lang="en-US" sz="2400" dirty="0"/>
               <a:t>Project tracker summarizes information like principal investigator (PI), deliverable, status, etc. </a:t>
             </a:r>
           </a:p>
@@ -7425,7 +7937,7 @@
 </p:sld>
 </file>
 
-<file path=ppt/slides/slide19.xml><?xml version="1.0" encoding="utf-8"?>
+<file path=ppt/slides/slide24.xml><?xml version="1.0" encoding="utf-8"?>
 <p:sld xmlns:a="http://schemas.openxmlformats.org/drawingml/2006/main" xmlns:r="http://schemas.openxmlformats.org/officeDocument/2006/relationships" xmlns:p="http://schemas.openxmlformats.org/presentationml/2006/main">
   <p:cSld>
     <p:spTree>
@@ -7543,204 +8055,7 @@
 </p:sld>
 </file>
 
-<file path=ppt/slides/slide2.xml><?xml version="1.0" encoding="utf-8"?>
-<p:sld xmlns:a="http://schemas.openxmlformats.org/drawingml/2006/main" xmlns:r="http://schemas.openxmlformats.org/officeDocument/2006/relationships" xmlns:p="http://schemas.openxmlformats.org/presentationml/2006/main">
-  <p:cSld>
-    <p:spTree>
-      <p:nvGrpSpPr>
-        <p:cNvPr id="1" name=""/>
-        <p:cNvGrpSpPr/>
-        <p:nvPr/>
-      </p:nvGrpSpPr>
-      <p:grpSpPr>
-        <a:xfrm>
-          <a:off x="0" y="0"/>
-          <a:ext cx="0" cy="0"/>
-          <a:chOff x="0" y="0"/>
-          <a:chExt cx="0" cy="0"/>
-        </a:xfrm>
-      </p:grpSpPr>
-      <p:sp>
-        <p:nvSpPr>
-          <p:cNvPr id="2" name="Title 1">
-            <a:extLst>
-              <a:ext uri="{FF2B5EF4-FFF2-40B4-BE49-F238E27FC236}">
-                <a16:creationId xmlns:a16="http://schemas.microsoft.com/office/drawing/2014/main" id="{8E20A4B1-CEFE-42F6-BE30-1CF39169F3F8}"/>
-              </a:ext>
-            </a:extLst>
-          </p:cNvPr>
-          <p:cNvSpPr>
-            <a:spLocks noGrp="1"/>
-          </p:cNvSpPr>
-          <p:nvPr>
-            <p:ph type="title"/>
-          </p:nvPr>
-        </p:nvSpPr>
-        <p:spPr/>
-        <p:txBody>
-          <a:bodyPr/>
-          <a:lstStyle/>
-          <a:p>
-            <a:r>
-              <a:rPr lang="en-US" dirty="0"/>
-              <a:t>Time &amp; the busy </a:t>
-            </a:r>
-            <a:r>
-              <a:rPr lang="en-US" dirty="0" err="1"/>
-              <a:t>RLady</a:t>
-            </a:r>
-            <a:endParaRPr lang="en-US" dirty="0"/>
-          </a:p>
-        </p:txBody>
-      </p:sp>
-      <p:sp>
-        <p:nvSpPr>
-          <p:cNvPr id="5" name="Content Placeholder 4">
-            <a:extLst>
-              <a:ext uri="{FF2B5EF4-FFF2-40B4-BE49-F238E27FC236}">
-                <a16:creationId xmlns:a16="http://schemas.microsoft.com/office/drawing/2014/main" id="{9C48C686-4E67-459C-8A8F-9A73F64F4E68}"/>
-              </a:ext>
-            </a:extLst>
-          </p:cNvPr>
-          <p:cNvSpPr>
-            <a:spLocks noGrp="1"/>
-          </p:cNvSpPr>
-          <p:nvPr>
-            <p:ph idx="1"/>
-          </p:nvPr>
-        </p:nvSpPr>
-        <p:spPr/>
-        <p:txBody>
-          <a:bodyPr/>
-          <a:lstStyle/>
-          <a:p>
-            <a:r>
-              <a:rPr lang="en-US" sz="2400" dirty="0"/>
-              <a:t>Often feels like there aren’t enough hours in the day</a:t>
-            </a:r>
-          </a:p>
-          <a:p>
-            <a:r>
-              <a:rPr lang="en-US" sz="2400" dirty="0"/>
-              <a:t>Start working on one project, check email, bounce to another project, maybe remember to go back to first project, and oh look! It’s 5pm</a:t>
-            </a:r>
-          </a:p>
-          <a:p>
-            <a:r>
-              <a:rPr lang="en-US" sz="2400" dirty="0"/>
-              <a:t>Long term: you have no recollection of how you’re spending your days</a:t>
-            </a:r>
-          </a:p>
-        </p:txBody>
-      </p:sp>
-      <p:pic>
-        <p:nvPicPr>
-          <p:cNvPr id="4098" name="Picture 2" descr="Image result for time management">
-            <a:extLst>
-              <a:ext uri="{FF2B5EF4-FFF2-40B4-BE49-F238E27FC236}">
-                <a16:creationId xmlns:a16="http://schemas.microsoft.com/office/drawing/2014/main" id="{F418449D-9875-4294-9A52-2986FF9D794A}"/>
-              </a:ext>
-            </a:extLst>
-          </p:cNvPr>
-          <p:cNvPicPr>
-            <a:picLocks noChangeAspect="1" noChangeArrowheads="1"/>
-          </p:cNvPicPr>
-          <p:nvPr/>
-        </p:nvPicPr>
-        <p:blipFill>
-          <a:blip r:embed="rId3">
-            <a:extLst>
-              <a:ext uri="{28A0092B-C50C-407E-A947-70E740481C1C}">
-                <a14:useLocalDpi xmlns:a14="http://schemas.microsoft.com/office/drawing/2010/main" val="0"/>
-              </a:ext>
-            </a:extLst>
-          </a:blip>
-          <a:srcRect/>
-          <a:stretch>
-            <a:fillRect/>
-          </a:stretch>
-        </p:blipFill>
-        <p:spPr bwMode="auto">
-          <a:xfrm>
-            <a:off x="965353" y="4071578"/>
-            <a:ext cx="3267075" cy="1400175"/>
-          </a:xfrm>
-          <a:prstGeom prst="rect">
-            <a:avLst/>
-          </a:prstGeom>
-          <a:noFill/>
-          <a:extLst>
-            <a:ext uri="{909E8E84-426E-40DD-AFC4-6F175D3DCCD1}">
-              <a14:hiddenFill xmlns:a14="http://schemas.microsoft.com/office/drawing/2010/main">
-                <a:solidFill>
-                  <a:srgbClr val="FFFFFF"/>
-                </a:solidFill>
-              </a14:hiddenFill>
-            </a:ext>
-          </a:extLst>
-        </p:spPr>
-      </p:pic>
-      <p:pic>
-        <p:nvPicPr>
-          <p:cNvPr id="4" name="Picture 2" descr="Image result for alice in wonderland rabbit time">
-            <a:extLst>
-              <a:ext uri="{FF2B5EF4-FFF2-40B4-BE49-F238E27FC236}">
-                <a16:creationId xmlns:a16="http://schemas.microsoft.com/office/drawing/2014/main" id="{6C594743-08C0-4041-A651-BC303D46531F}"/>
-              </a:ext>
-            </a:extLst>
-          </p:cNvPr>
-          <p:cNvPicPr>
-            <a:picLocks noChangeAspect="1" noChangeArrowheads="1"/>
-          </p:cNvPicPr>
-          <p:nvPr/>
-        </p:nvPicPr>
-        <p:blipFill>
-          <a:blip r:embed="rId4">
-            <a:extLst>
-              <a:ext uri="{28A0092B-C50C-407E-A947-70E740481C1C}">
-                <a14:useLocalDpi xmlns:a14="http://schemas.microsoft.com/office/drawing/2010/main" val="0"/>
-              </a:ext>
-            </a:extLst>
-          </a:blip>
-          <a:srcRect/>
-          <a:stretch>
-            <a:fillRect/>
-          </a:stretch>
-        </p:blipFill>
-        <p:spPr bwMode="auto">
-          <a:xfrm>
-            <a:off x="5382411" y="3814404"/>
-            <a:ext cx="2390775" cy="1914525"/>
-          </a:xfrm>
-          <a:prstGeom prst="rect">
-            <a:avLst/>
-          </a:prstGeom>
-          <a:noFill/>
-          <a:extLst>
-            <a:ext uri="{909E8E84-426E-40DD-AFC4-6F175D3DCCD1}">
-              <a14:hiddenFill xmlns:a14="http://schemas.microsoft.com/office/drawing/2010/main">
-                <a:solidFill>
-                  <a:srgbClr val="FFFFFF"/>
-                </a:solidFill>
-              </a14:hiddenFill>
-            </a:ext>
-          </a:extLst>
-        </p:spPr>
-      </p:pic>
-    </p:spTree>
-    <p:extLst>
-      <p:ext uri="{BB962C8B-B14F-4D97-AF65-F5344CB8AC3E}">
-        <p14:creationId xmlns:p14="http://schemas.microsoft.com/office/powerpoint/2010/main" val="2336468093"/>
-      </p:ext>
-    </p:extLst>
-  </p:cSld>
-  <p:clrMapOvr>
-    <a:masterClrMapping/>
-  </p:clrMapOvr>
-</p:sld>
-</file>
-
-<file path=ppt/slides/slide20.xml><?xml version="1.0" encoding="utf-8"?>
+<file path=ppt/slides/slide25.xml><?xml version="1.0" encoding="utf-8"?>
 <p:sld xmlns:a="http://schemas.openxmlformats.org/drawingml/2006/main" xmlns:r="http://schemas.openxmlformats.org/officeDocument/2006/relationships" xmlns:p="http://schemas.openxmlformats.org/presentationml/2006/main">
   <p:cSld>
     <p:spTree>
@@ -7858,7 +8173,7 @@
 </p:sld>
 </file>
 
-<file path=ppt/slides/slide21.xml><?xml version="1.0" encoding="utf-8"?>
+<file path=ppt/slides/slide26.xml><?xml version="1.0" encoding="utf-8"?>
 <p:sld xmlns:a="http://schemas.openxmlformats.org/drawingml/2006/main" xmlns:r="http://schemas.openxmlformats.org/officeDocument/2006/relationships" xmlns:p="http://schemas.openxmlformats.org/presentationml/2006/main">
   <p:cSld>
     <p:spTree>
@@ -7981,7 +8296,7 @@
 </p:sld>
 </file>
 
-<file path=ppt/slides/slide22.xml><?xml version="1.0" encoding="utf-8"?>
+<file path=ppt/slides/slide27.xml><?xml version="1.0" encoding="utf-8"?>
 <p:sld xmlns:a="http://schemas.openxmlformats.org/drawingml/2006/main" xmlns:r="http://schemas.openxmlformats.org/officeDocument/2006/relationships" xmlns:p="http://schemas.openxmlformats.org/presentationml/2006/main">
   <p:cSld>
     <p:spTree>
@@ -8140,7 +8455,100 @@
 </p:sld>
 </file>
 
-<file path=ppt/slides/slide23.xml><?xml version="1.0" encoding="utf-8"?>
+<file path=ppt/slides/slide28.xml><?xml version="1.0" encoding="utf-8"?>
+<p:sld xmlns:a="http://schemas.openxmlformats.org/drawingml/2006/main" xmlns:r="http://schemas.openxmlformats.org/officeDocument/2006/relationships" xmlns:p="http://schemas.openxmlformats.org/presentationml/2006/main">
+  <p:cSld>
+    <p:spTree>
+      <p:nvGrpSpPr>
+        <p:cNvPr id="1" name=""/>
+        <p:cNvGrpSpPr/>
+        <p:nvPr/>
+      </p:nvGrpSpPr>
+      <p:grpSpPr>
+        <a:xfrm>
+          <a:off x="0" y="0"/>
+          <a:ext cx="0" cy="0"/>
+          <a:chOff x="0" y="0"/>
+          <a:chExt cx="0" cy="0"/>
+        </a:xfrm>
+      </p:grpSpPr>
+      <p:sp>
+        <p:nvSpPr>
+          <p:cNvPr id="2" name="Title 1">
+            <a:extLst>
+              <a:ext uri="{FF2B5EF4-FFF2-40B4-BE49-F238E27FC236}">
+                <a16:creationId xmlns:a16="http://schemas.microsoft.com/office/drawing/2014/main" id="{EB72F780-0A20-420E-BDE8-1E2357373C89}"/>
+              </a:ext>
+            </a:extLst>
+          </p:cNvPr>
+          <p:cNvSpPr>
+            <a:spLocks noGrp="1"/>
+          </p:cNvSpPr>
+          <p:nvPr>
+            <p:ph type="title"/>
+          </p:nvPr>
+        </p:nvSpPr>
+        <p:spPr/>
+        <p:txBody>
+          <a:bodyPr/>
+          <a:lstStyle/>
+          <a:p>
+            <a:r>
+              <a:rPr lang="en-US" dirty="0">
+                <a:solidFill>
+                  <a:schemeClr val="accent2"/>
+                </a:solidFill>
+              </a:rPr>
+              <a:t>R Code Highlights:</a:t>
+            </a:r>
+            <a:br>
+              <a:rPr lang="en-US" dirty="0"/>
+            </a:br>
+            <a:r>
+              <a:rPr lang="en-US" dirty="0"/>
+              <a:t>	</a:t>
+            </a:r>
+            <a:r>
+              <a:rPr lang="en-US" dirty="0">
+                <a:solidFill>
+                  <a:schemeClr val="accent1"/>
+                </a:solidFill>
+              </a:rPr>
+              <a:t>The switch function and </a:t>
+            </a:r>
+            <a:r>
+              <a:rPr lang="en-US" dirty="0" err="1">
+                <a:solidFill>
+                  <a:schemeClr val="accent1"/>
+                </a:solidFill>
+              </a:rPr>
+              <a:t>geom_segment</a:t>
+            </a:r>
+            <a:r>
+              <a:rPr lang="en-US" dirty="0">
+                <a:solidFill>
+                  <a:schemeClr val="accent1"/>
+                </a:solidFill>
+              </a:rPr>
+              <a:t>()</a:t>
+            </a:r>
+          </a:p>
+        </p:txBody>
+      </p:sp>
+    </p:spTree>
+    <p:extLst>
+      <p:ext uri="{BB962C8B-B14F-4D97-AF65-F5344CB8AC3E}">
+        <p14:creationId xmlns:p14="http://schemas.microsoft.com/office/powerpoint/2010/main" val="3104528174"/>
+      </p:ext>
+    </p:extLst>
+  </p:cSld>
+  <p:clrMapOvr>
+    <a:masterClrMapping/>
+  </p:clrMapOvr>
+</p:sld>
+</file>
+
+<file path=ppt/slides/slide29.xml><?xml version="1.0" encoding="utf-8"?>
 <p:sld xmlns:a="http://schemas.openxmlformats.org/drawingml/2006/main" xmlns:r="http://schemas.openxmlformats.org/officeDocument/2006/relationships" xmlns:p="http://schemas.openxmlformats.org/presentationml/2006/main">
   <p:cSld>
     <p:spTree>
@@ -8257,7 +8665,122 @@
 </p:sld>
 </file>
 
-<file path=ppt/slides/slide24.xml><?xml version="1.0" encoding="utf-8"?>
+<file path=ppt/slides/slide3.xml><?xml version="1.0" encoding="utf-8"?>
+<p:sld xmlns:a="http://schemas.openxmlformats.org/drawingml/2006/main" xmlns:r="http://schemas.openxmlformats.org/officeDocument/2006/relationships" xmlns:p="http://schemas.openxmlformats.org/presentationml/2006/main">
+  <p:cSld>
+    <p:spTree>
+      <p:nvGrpSpPr>
+        <p:cNvPr id="1" name=""/>
+        <p:cNvGrpSpPr/>
+        <p:nvPr/>
+      </p:nvGrpSpPr>
+      <p:grpSpPr>
+        <a:xfrm>
+          <a:off x="0" y="0"/>
+          <a:ext cx="0" cy="0"/>
+          <a:chOff x="0" y="0"/>
+          <a:chExt cx="0" cy="0"/>
+        </a:xfrm>
+      </p:grpSpPr>
+      <p:sp>
+        <p:nvSpPr>
+          <p:cNvPr id="2" name="Title 1">
+            <a:extLst>
+              <a:ext uri="{FF2B5EF4-FFF2-40B4-BE49-F238E27FC236}">
+                <a16:creationId xmlns:a16="http://schemas.microsoft.com/office/drawing/2014/main" id="{7CCFB932-F1A0-458A-830D-3BBD6D4ACBAC}"/>
+              </a:ext>
+            </a:extLst>
+          </p:cNvPr>
+          <p:cNvSpPr>
+            <a:spLocks noGrp="1"/>
+          </p:cNvSpPr>
+          <p:nvPr>
+            <p:ph type="title"/>
+          </p:nvPr>
+        </p:nvSpPr>
+        <p:spPr/>
+        <p:txBody>
+          <a:bodyPr/>
+          <a:lstStyle/>
+          <a:p>
+            <a:r>
+              <a:rPr lang="en-US" dirty="0"/>
+              <a:t>Why use a time tracker summary app?</a:t>
+            </a:r>
+          </a:p>
+        </p:txBody>
+      </p:sp>
+      <p:sp>
+        <p:nvSpPr>
+          <p:cNvPr id="3" name="Content Placeholder 2">
+            <a:extLst>
+              <a:ext uri="{FF2B5EF4-FFF2-40B4-BE49-F238E27FC236}">
+                <a16:creationId xmlns:a16="http://schemas.microsoft.com/office/drawing/2014/main" id="{5640F286-9FC2-4C24-9810-0AD9959C4F7C}"/>
+              </a:ext>
+            </a:extLst>
+          </p:cNvPr>
+          <p:cNvSpPr>
+            <a:spLocks noGrp="1"/>
+          </p:cNvSpPr>
+          <p:nvPr>
+            <p:ph idx="1"/>
+          </p:nvPr>
+        </p:nvSpPr>
+        <p:spPr/>
+        <p:txBody>
+          <a:bodyPr/>
+          <a:lstStyle/>
+          <a:p>
+            <a:r>
+              <a:rPr lang="en-US" sz="2800" i="1" dirty="0">
+                <a:solidFill>
+                  <a:schemeClr val="accent1"/>
+                </a:solidFill>
+              </a:rPr>
+              <a:t>It’s hard to manage your time if you don’t know how you’re spending your time</a:t>
+            </a:r>
+          </a:p>
+          <a:p>
+            <a:r>
+              <a:rPr lang="en-US" sz="2800" dirty="0"/>
+              <a:t>Recall is often inaccurate</a:t>
+            </a:r>
+          </a:p>
+          <a:p>
+            <a:pPr lvl="1"/>
+            <a:r>
+              <a:rPr lang="en-US" sz="2400" dirty="0"/>
+              <a:t>Feels like we spend a lot of time on projects we don’t love and not enough time on projects we do</a:t>
+            </a:r>
+          </a:p>
+          <a:p>
+            <a:r>
+              <a:rPr lang="en-US" sz="2800" dirty="0"/>
+              <a:t>Useful for goal-setting and evaluating</a:t>
+            </a:r>
+          </a:p>
+          <a:p>
+            <a:r>
+              <a:rPr lang="en-US" sz="2800" dirty="0"/>
+              <a:t>Aids in forecasting/resource allocation decisions</a:t>
+            </a:r>
+          </a:p>
+        </p:txBody>
+      </p:sp>
+    </p:spTree>
+    <p:extLst>
+      <p:ext uri="{BB962C8B-B14F-4D97-AF65-F5344CB8AC3E}">
+        <p14:creationId xmlns:p14="http://schemas.microsoft.com/office/powerpoint/2010/main" val="1628145875"/>
+      </p:ext>
+    </p:extLst>
+  </p:cSld>
+  <p:clrMapOvr>
+    <a:masterClrMapping/>
+  </p:clrMapOvr>
+</p:sld>
+</file>
+
+<file path=ppt/slides/slide30.xml><?xml version="1.0" encoding="utf-8"?>
 <p:sld xmlns:a="http://schemas.openxmlformats.org/drawingml/2006/main" xmlns:r="http://schemas.openxmlformats.org/officeDocument/2006/relationships" xmlns:p="http://schemas.openxmlformats.org/presentationml/2006/main">
   <p:cSld>
     <p:spTree>
@@ -8346,6 +8869,24 @@
           </a:p>
           <a:p>
             <a:r>
+              <a:rPr lang="en-US" sz="1800" dirty="0" err="1">
+                <a:latin typeface="Courier"/>
+              </a:rPr>
+              <a:t>input$status_filter_bar</a:t>
+            </a:r>
+            <a:r>
+              <a:rPr lang="en-US" sz="1800" dirty="0">
+                <a:latin typeface="Courier"/>
+              </a:rPr>
+              <a:t> </a:t>
+            </a:r>
+            <a:r>
+              <a:rPr lang="en-US" sz="2000" dirty="0"/>
+              <a:t>returns either “Active projects” or “All projects” depending on which radio button is selected </a:t>
+            </a:r>
+          </a:p>
+          <a:p>
+            <a:r>
               <a:rPr lang="en-US" sz="2000" dirty="0"/>
               <a:t>Code (</a:t>
             </a:r>
@@ -8373,27 +8914,7 @@
             </a:endParaRPr>
           </a:p>
           <a:p>
-            <a:endParaRPr lang="en-US" sz="1600" dirty="0">
-              <a:latin typeface="Courier"/>
-            </a:endParaRPr>
-          </a:p>
-          <a:p>
-            <a:r>
-              <a:rPr lang="en-US" sz="1600" dirty="0" err="1">
-                <a:latin typeface="Courier"/>
-              </a:rPr>
-              <a:t>input$status_filter_bar</a:t>
-            </a:r>
-            <a:r>
-              <a:rPr lang="en-US" sz="1600" dirty="0">
-                <a:latin typeface="Courier"/>
-              </a:rPr>
-              <a:t> </a:t>
-            </a:r>
-            <a:r>
-              <a:rPr lang="en-US" sz="1800" dirty="0"/>
-              <a:t>returns either “Active projects” or “All projects” depending on which radio button is selected</a:t>
-            </a:r>
+            <a:endParaRPr lang="en-US" sz="1800" dirty="0"/>
           </a:p>
           <a:p>
             <a:r>
@@ -8424,7 +8945,7 @@
         </p:nvSpPr>
         <p:spPr>
           <a:xfrm>
-            <a:off x="1234834" y="3854394"/>
+            <a:off x="1100363" y="4508818"/>
             <a:ext cx="6741459" cy="954107"/>
           </a:xfrm>
           <a:prstGeom prst="rect">
@@ -8734,7 +9255,7 @@
 </p:sld>
 </file>
 
-<file path=ppt/slides/slide25.xml><?xml version="1.0" encoding="utf-8"?>
+<file path=ppt/slides/slide31.xml><?xml version="1.0" encoding="utf-8"?>
 <p:sld xmlns:a="http://schemas.openxmlformats.org/drawingml/2006/main" xmlns:r="http://schemas.openxmlformats.org/officeDocument/2006/relationships" xmlns:p="http://schemas.openxmlformats.org/presentationml/2006/main">
   <p:cSld>
     <p:spTree>
@@ -8886,7 +9407,7 @@
 </p:sld>
 </file>
 
-<file path=ppt/slides/slide26.xml><?xml version="1.0" encoding="utf-8"?>
+<file path=ppt/slides/slide32.xml><?xml version="1.0" encoding="utf-8"?>
 <p:sld xmlns:a="http://schemas.openxmlformats.org/drawingml/2006/main" xmlns:r="http://schemas.openxmlformats.org/officeDocument/2006/relationships" xmlns:p="http://schemas.openxmlformats.org/presentationml/2006/main">
   <p:cSld>
     <p:spTree>
@@ -8933,10 +9454,10 @@
       </p:sp>
       <p:sp>
         <p:nvSpPr>
-          <p:cNvPr id="3" name="Content Placeholder 2">
+          <p:cNvPr id="5" name="Content Placeholder 4">
             <a:extLst>
               <a:ext uri="{FF2B5EF4-FFF2-40B4-BE49-F238E27FC236}">
-                <a16:creationId xmlns:a16="http://schemas.microsoft.com/office/drawing/2014/main" id="{6DA2F88A-E23D-4DBF-88BD-493188AB1142}"/>
+                <a16:creationId xmlns:a16="http://schemas.microsoft.com/office/drawing/2014/main" id="{4623352B-A8B5-4C6F-889C-A0CFFAFF326D}"/>
               </a:ext>
             </a:extLst>
           </p:cNvPr>
@@ -8952,6 +9473,226 @@
           <a:bodyPr/>
           <a:lstStyle/>
           <a:p>
+            <a:pPr marL="0" indent="0">
+              <a:buNone/>
+            </a:pPr>
+            <a:r>
+              <a:rPr lang="en-US" sz="2400" b="1" dirty="0"/>
+              <a:t>Data wrangling:</a:t>
+            </a:r>
+            <a:r>
+              <a:rPr lang="en-US" sz="2400" dirty="0"/>
+              <a:t> Summarize hourly data into project phase start / stop times</a:t>
+            </a:r>
+          </a:p>
+        </p:txBody>
+      </p:sp>
+      <p:pic>
+        <p:nvPicPr>
+          <p:cNvPr id="6" name="Picture 5">
+            <a:extLst>
+              <a:ext uri="{FF2B5EF4-FFF2-40B4-BE49-F238E27FC236}">
+                <a16:creationId xmlns:a16="http://schemas.microsoft.com/office/drawing/2014/main" id="{5B0E4286-A70E-4F92-BF78-AD01D59E0E4C}"/>
+              </a:ext>
+            </a:extLst>
+          </p:cNvPr>
+          <p:cNvPicPr>
+            <a:picLocks noChangeAspect="1"/>
+          </p:cNvPicPr>
+          <p:nvPr/>
+        </p:nvPicPr>
+        <p:blipFill>
+          <a:blip r:embed="rId2"/>
+          <a:stretch>
+            <a:fillRect/>
+          </a:stretch>
+        </p:blipFill>
+        <p:spPr>
+          <a:xfrm>
+            <a:off x="2489178" y="4695022"/>
+            <a:ext cx="4165644" cy="1983324"/>
+          </a:xfrm>
+          <a:prstGeom prst="rect">
+            <a:avLst/>
+          </a:prstGeom>
+        </p:spPr>
+      </p:pic>
+      <p:sp>
+        <p:nvSpPr>
+          <p:cNvPr id="7" name="Arrow: Down 6">
+            <a:extLst>
+              <a:ext uri="{FF2B5EF4-FFF2-40B4-BE49-F238E27FC236}">
+                <a16:creationId xmlns:a16="http://schemas.microsoft.com/office/drawing/2014/main" id="{32B2FC51-9C10-404B-A681-F8E81376C67B}"/>
+              </a:ext>
+            </a:extLst>
+          </p:cNvPr>
+          <p:cNvSpPr/>
+          <p:nvPr/>
+        </p:nvSpPr>
+        <p:spPr>
+          <a:xfrm>
+            <a:off x="4202153" y="4096542"/>
+            <a:ext cx="403411" cy="579402"/>
+          </a:xfrm>
+          <a:prstGeom prst="downArrow">
+            <a:avLst/>
+          </a:prstGeom>
+        </p:spPr>
+        <p:style>
+          <a:lnRef idx="2">
+            <a:schemeClr val="accent1">
+              <a:shade val="50000"/>
+            </a:schemeClr>
+          </a:lnRef>
+          <a:fillRef idx="1">
+            <a:schemeClr val="accent1"/>
+          </a:fillRef>
+          <a:effectRef idx="0">
+            <a:schemeClr val="accent1"/>
+          </a:effectRef>
+          <a:fontRef idx="minor">
+            <a:schemeClr val="lt1"/>
+          </a:fontRef>
+        </p:style>
+        <p:txBody>
+          <a:bodyPr rtlCol="0" anchor="ctr"/>
+          <a:lstStyle/>
+          <a:p>
+            <a:pPr algn="ctr"/>
+            <a:endParaRPr lang="en-US"/>
+          </a:p>
+        </p:txBody>
+      </p:sp>
+      <p:pic>
+        <p:nvPicPr>
+          <p:cNvPr id="8" name="Picture 7">
+            <a:extLst>
+              <a:ext uri="{FF2B5EF4-FFF2-40B4-BE49-F238E27FC236}">
+                <a16:creationId xmlns:a16="http://schemas.microsoft.com/office/drawing/2014/main" id="{02572FA0-669F-4799-87D2-70A6F72E0A38}"/>
+              </a:ext>
+            </a:extLst>
+          </p:cNvPr>
+          <p:cNvPicPr>
+            <a:picLocks noChangeAspect="1"/>
+          </p:cNvPicPr>
+          <p:nvPr/>
+        </p:nvPicPr>
+        <p:blipFill>
+          <a:blip r:embed="rId3"/>
+          <a:stretch>
+            <a:fillRect/>
+          </a:stretch>
+        </p:blipFill>
+        <p:spPr>
+          <a:xfrm>
+            <a:off x="1063079" y="2010172"/>
+            <a:ext cx="6886317" cy="2067292"/>
+          </a:xfrm>
+          <a:prstGeom prst="rect">
+            <a:avLst/>
+          </a:prstGeom>
+        </p:spPr>
+      </p:pic>
+      <p:sp>
+        <p:nvSpPr>
+          <p:cNvPr id="9" name="Rectangle 8">
+            <a:extLst>
+              <a:ext uri="{FF2B5EF4-FFF2-40B4-BE49-F238E27FC236}">
+                <a16:creationId xmlns:a16="http://schemas.microsoft.com/office/drawing/2014/main" id="{6793DD58-34FF-4DA8-95CD-7A3FB197DFC5}"/>
+              </a:ext>
+            </a:extLst>
+          </p:cNvPr>
+          <p:cNvSpPr/>
+          <p:nvPr/>
+        </p:nvSpPr>
+        <p:spPr>
+          <a:xfrm>
+            <a:off x="1156447" y="2303929"/>
+            <a:ext cx="6651812" cy="367553"/>
+          </a:xfrm>
+          <a:prstGeom prst="rect">
+            <a:avLst/>
+          </a:prstGeom>
+          <a:solidFill>
+            <a:schemeClr val="accent3">
+              <a:alpha val="50000"/>
+            </a:schemeClr>
+          </a:solidFill>
+          <a:ln>
+            <a:noFill/>
+          </a:ln>
+        </p:spPr>
+        <p:style>
+          <a:lnRef idx="0">
+            <a:scrgbClr r="0" g="0" b="0"/>
+          </a:lnRef>
+          <a:fillRef idx="0">
+            <a:scrgbClr r="0" g="0" b="0"/>
+          </a:fillRef>
+          <a:effectRef idx="0">
+            <a:scrgbClr r="0" g="0" b="0"/>
+          </a:effectRef>
+          <a:fontRef idx="minor">
+            <a:schemeClr val="lt1"/>
+          </a:fontRef>
+        </p:style>
+        <p:txBody>
+          <a:bodyPr rtlCol="0" anchor="ctr"/>
+          <a:lstStyle/>
+          <a:p>
+            <a:pPr algn="ctr"/>
+            <a:endParaRPr lang="en-US"/>
+          </a:p>
+        </p:txBody>
+      </p:sp>
+      <p:sp>
+        <p:nvSpPr>
+          <p:cNvPr id="10" name="Rectangle 9">
+            <a:extLst>
+              <a:ext uri="{FF2B5EF4-FFF2-40B4-BE49-F238E27FC236}">
+                <a16:creationId xmlns:a16="http://schemas.microsoft.com/office/drawing/2014/main" id="{6FD4C215-274A-4633-A823-5DF5AAA80F50}"/>
+              </a:ext>
+            </a:extLst>
+          </p:cNvPr>
+          <p:cNvSpPr/>
+          <p:nvPr/>
+        </p:nvSpPr>
+        <p:spPr>
+          <a:xfrm>
+            <a:off x="2590800" y="5041007"/>
+            <a:ext cx="1021976" cy="1621135"/>
+          </a:xfrm>
+          <a:prstGeom prst="rect">
+            <a:avLst/>
+          </a:prstGeom>
+          <a:solidFill>
+            <a:schemeClr val="accent3">
+              <a:alpha val="50000"/>
+            </a:schemeClr>
+          </a:solidFill>
+          <a:ln>
+            <a:noFill/>
+          </a:ln>
+        </p:spPr>
+        <p:style>
+          <a:lnRef idx="0">
+            <a:scrgbClr r="0" g="0" b="0"/>
+          </a:lnRef>
+          <a:fillRef idx="0">
+            <a:scrgbClr r="0" g="0" b="0"/>
+          </a:fillRef>
+          <a:effectRef idx="0">
+            <a:scrgbClr r="0" g="0" b="0"/>
+          </a:effectRef>
+          <a:fontRef idx="minor">
+            <a:schemeClr val="lt1"/>
+          </a:fontRef>
+        </p:style>
+        <p:txBody>
+          <a:bodyPr rtlCol="0" anchor="ctr"/>
+          <a:lstStyle/>
+          <a:p>
+            <a:pPr algn="ctr"/>
             <a:endParaRPr lang="en-US"/>
           </a:p>
         </p:txBody>
@@ -8969,7 +9710,895 @@
 </p:sld>
 </file>
 
-<file path=ppt/slides/slide27.xml><?xml version="1.0" encoding="utf-8"?>
+<file path=ppt/slides/slide33.xml><?xml version="1.0" encoding="utf-8"?>
+<p:sld xmlns:a="http://schemas.openxmlformats.org/drawingml/2006/main" xmlns:r="http://schemas.openxmlformats.org/officeDocument/2006/relationships" xmlns:p="http://schemas.openxmlformats.org/presentationml/2006/main">
+  <p:cSld>
+    <p:spTree>
+      <p:nvGrpSpPr>
+        <p:cNvPr id="1" name=""/>
+        <p:cNvGrpSpPr/>
+        <p:nvPr/>
+      </p:nvGrpSpPr>
+      <p:grpSpPr>
+        <a:xfrm>
+          <a:off x="0" y="0"/>
+          <a:ext cx="0" cy="0"/>
+          <a:chOff x="0" y="0"/>
+          <a:chExt cx="0" cy="0"/>
+        </a:xfrm>
+      </p:grpSpPr>
+      <p:sp>
+        <p:nvSpPr>
+          <p:cNvPr id="2" name="Title 1">
+            <a:extLst>
+              <a:ext uri="{FF2B5EF4-FFF2-40B4-BE49-F238E27FC236}">
+                <a16:creationId xmlns:a16="http://schemas.microsoft.com/office/drawing/2014/main" id="{213736E0-77B2-4109-9DA0-AC5C744247E8}"/>
+              </a:ext>
+            </a:extLst>
+          </p:cNvPr>
+          <p:cNvSpPr>
+            <a:spLocks noGrp="1"/>
+          </p:cNvSpPr>
+          <p:nvPr>
+            <p:ph type="title"/>
+          </p:nvPr>
+        </p:nvSpPr>
+        <p:spPr/>
+        <p:txBody>
+          <a:bodyPr/>
+          <a:lstStyle/>
+          <a:p>
+            <a:r>
+              <a:rPr lang="en-US" dirty="0"/>
+              <a:t>Gantt chart</a:t>
+            </a:r>
+          </a:p>
+        </p:txBody>
+      </p:sp>
+      <p:sp>
+        <p:nvSpPr>
+          <p:cNvPr id="4" name="Rectangle 3">
+            <a:extLst>
+              <a:ext uri="{FF2B5EF4-FFF2-40B4-BE49-F238E27FC236}">
+                <a16:creationId xmlns:a16="http://schemas.microsoft.com/office/drawing/2014/main" id="{FAA39DE1-00CB-442F-807E-ABC638B25941}"/>
+              </a:ext>
+            </a:extLst>
+          </p:cNvPr>
+          <p:cNvSpPr/>
+          <p:nvPr/>
+        </p:nvSpPr>
+        <p:spPr>
+          <a:xfrm>
+            <a:off x="457199" y="1010107"/>
+            <a:ext cx="8686801" cy="2831544"/>
+          </a:xfrm>
+          <a:prstGeom prst="rect">
+            <a:avLst/>
+          </a:prstGeom>
+        </p:spPr>
+        <p:txBody>
+          <a:bodyPr wrap="square">
+            <a:spAutoFit/>
+          </a:bodyPr>
+          <a:lstStyle/>
+          <a:p>
+            <a:r>
+              <a:rPr lang="en-US" sz="2000" b="1" dirty="0">
+                <a:latin typeface="Arial"/>
+                <a:cs typeface="Arial"/>
+              </a:rPr>
+              <a:t>Data viz:</a:t>
+            </a:r>
+            <a:br>
+              <a:rPr lang="en-US" sz="1400" dirty="0"/>
+            </a:br>
+            <a:r>
+              <a:rPr lang="en-US" sz="1400" dirty="0">
+                <a:latin typeface="Courier"/>
+              </a:rPr>
+              <a:t>    </a:t>
+            </a:r>
+            <a:r>
+              <a:rPr lang="en-US" sz="1400" b="1" dirty="0" err="1">
+                <a:solidFill>
+                  <a:srgbClr val="007020"/>
+                </a:solidFill>
+                <a:latin typeface="Courier"/>
+              </a:rPr>
+              <a:t>ggplot</a:t>
+            </a:r>
+            <a:r>
+              <a:rPr lang="en-US" sz="1400" dirty="0">
+                <a:latin typeface="Courier"/>
+              </a:rPr>
+              <a:t>(</a:t>
+            </a:r>
+            <a:r>
+              <a:rPr lang="en-US" sz="1400" dirty="0" err="1">
+                <a:latin typeface="Courier"/>
+              </a:rPr>
+              <a:t>phase_filtered</a:t>
+            </a:r>
+            <a:r>
+              <a:rPr lang="en-US" sz="1400" dirty="0">
+                <a:latin typeface="Courier"/>
+              </a:rPr>
+              <a:t>) </a:t>
+            </a:r>
+            <a:r>
+              <a:rPr lang="en-US" sz="1400" dirty="0">
+                <a:solidFill>
+                  <a:srgbClr val="666666"/>
+                </a:solidFill>
+                <a:latin typeface="Courier"/>
+              </a:rPr>
+              <a:t>+</a:t>
+            </a:r>
+            <a:br>
+              <a:rPr lang="en-US" sz="1400" dirty="0"/>
+            </a:br>
+            <a:r>
+              <a:rPr lang="en-US" sz="1400" dirty="0">
+                <a:solidFill>
+                  <a:srgbClr val="4070A0"/>
+                </a:solidFill>
+                <a:latin typeface="Courier"/>
+              </a:rPr>
+              <a:t>      </a:t>
+            </a:r>
+            <a:r>
+              <a:rPr lang="en-US" sz="1400" b="1" dirty="0" err="1">
+                <a:solidFill>
+                  <a:srgbClr val="007020"/>
+                </a:solidFill>
+                <a:latin typeface="Courier"/>
+              </a:rPr>
+              <a:t>geom_segment</a:t>
+            </a:r>
+            <a:r>
+              <a:rPr lang="en-US" sz="1400" dirty="0">
+                <a:latin typeface="Courier"/>
+              </a:rPr>
+              <a:t>(</a:t>
+            </a:r>
+            <a:r>
+              <a:rPr lang="en-US" sz="1400" b="1" dirty="0" err="1">
+                <a:solidFill>
+                  <a:srgbClr val="007020"/>
+                </a:solidFill>
+                <a:latin typeface="Courier"/>
+              </a:rPr>
+              <a:t>aes</a:t>
+            </a:r>
+            <a:r>
+              <a:rPr lang="en-US" sz="1400" dirty="0">
+                <a:latin typeface="Courier"/>
+              </a:rPr>
+              <a:t>(</a:t>
+            </a:r>
+            <a:r>
+              <a:rPr lang="en-US" sz="1400" dirty="0">
+                <a:solidFill>
+                  <a:srgbClr val="902000"/>
+                </a:solidFill>
+                <a:latin typeface="Courier"/>
+              </a:rPr>
+              <a:t>x =</a:t>
+            </a:r>
+            <a:r>
+              <a:rPr lang="en-US" sz="1400" dirty="0">
+                <a:latin typeface="Courier"/>
+              </a:rPr>
+              <a:t> </a:t>
+            </a:r>
+            <a:r>
+              <a:rPr lang="en-US" sz="1400" dirty="0" err="1">
+                <a:latin typeface="Courier"/>
+              </a:rPr>
+              <a:t>start_dt</a:t>
+            </a:r>
+            <a:r>
+              <a:rPr lang="en-US" sz="1400" dirty="0">
+                <a:latin typeface="Courier"/>
+              </a:rPr>
+              <a:t>, </a:t>
+            </a:r>
+            <a:r>
+              <a:rPr lang="en-US" sz="1400" dirty="0" err="1">
+                <a:solidFill>
+                  <a:srgbClr val="902000"/>
+                </a:solidFill>
+                <a:latin typeface="Courier"/>
+              </a:rPr>
+              <a:t>xend</a:t>
+            </a:r>
+            <a:r>
+              <a:rPr lang="en-US" sz="1400" dirty="0">
+                <a:solidFill>
+                  <a:srgbClr val="902000"/>
+                </a:solidFill>
+                <a:latin typeface="Courier"/>
+              </a:rPr>
+              <a:t> =</a:t>
+            </a:r>
+            <a:r>
+              <a:rPr lang="en-US" sz="1400" dirty="0">
+                <a:latin typeface="Courier"/>
+              </a:rPr>
+              <a:t> </a:t>
+            </a:r>
+            <a:r>
+              <a:rPr lang="en-US" sz="1400" dirty="0" err="1">
+                <a:latin typeface="Courier"/>
+              </a:rPr>
+              <a:t>end_dt</a:t>
+            </a:r>
+            <a:r>
+              <a:rPr lang="en-US" sz="1400" dirty="0">
+                <a:latin typeface="Courier"/>
+              </a:rPr>
+              <a:t>, </a:t>
+            </a:r>
+            <a:br>
+              <a:rPr lang="en-US" sz="1400" dirty="0"/>
+            </a:br>
+            <a:r>
+              <a:rPr lang="en-US" sz="1400" dirty="0">
+                <a:latin typeface="Courier"/>
+              </a:rPr>
+              <a:t>                       </a:t>
+            </a:r>
+            <a:r>
+              <a:rPr lang="en-US" sz="1400" dirty="0">
+                <a:solidFill>
+                  <a:srgbClr val="902000"/>
+                </a:solidFill>
+                <a:latin typeface="Courier"/>
+              </a:rPr>
+              <a:t>y =</a:t>
+            </a:r>
+            <a:r>
+              <a:rPr lang="en-US" sz="1400" dirty="0">
+                <a:latin typeface="Courier"/>
+              </a:rPr>
+              <a:t> </a:t>
+            </a:r>
+            <a:r>
+              <a:rPr lang="en-US" sz="1400" dirty="0" err="1">
+                <a:latin typeface="Courier"/>
+              </a:rPr>
+              <a:t>study_title</a:t>
+            </a:r>
+            <a:r>
+              <a:rPr lang="en-US" sz="1400" dirty="0">
+                <a:latin typeface="Courier"/>
+              </a:rPr>
+              <a:t>, </a:t>
+            </a:r>
+            <a:r>
+              <a:rPr lang="en-US" sz="1400" dirty="0" err="1">
+                <a:solidFill>
+                  <a:srgbClr val="902000"/>
+                </a:solidFill>
+                <a:latin typeface="Courier"/>
+              </a:rPr>
+              <a:t>yend</a:t>
+            </a:r>
+            <a:r>
+              <a:rPr lang="en-US" sz="1400" dirty="0">
+                <a:solidFill>
+                  <a:srgbClr val="902000"/>
+                </a:solidFill>
+                <a:latin typeface="Courier"/>
+              </a:rPr>
+              <a:t> =</a:t>
+            </a:r>
+            <a:r>
+              <a:rPr lang="en-US" sz="1400" dirty="0">
+                <a:latin typeface="Courier"/>
+              </a:rPr>
+              <a:t> </a:t>
+            </a:r>
+            <a:r>
+              <a:rPr lang="en-US" sz="1400" dirty="0" err="1">
+                <a:latin typeface="Courier"/>
+              </a:rPr>
+              <a:t>study_title</a:t>
+            </a:r>
+            <a:r>
+              <a:rPr lang="en-US" sz="1400" dirty="0">
+                <a:latin typeface="Courier"/>
+              </a:rPr>
+              <a:t>, </a:t>
+            </a:r>
+            <a:br>
+              <a:rPr lang="en-US" sz="1400" dirty="0"/>
+            </a:br>
+            <a:r>
+              <a:rPr lang="en-US" sz="1400" dirty="0">
+                <a:latin typeface="Courier"/>
+              </a:rPr>
+              <a:t>                       </a:t>
+            </a:r>
+            <a:r>
+              <a:rPr lang="en-US" sz="1400" dirty="0" err="1">
+                <a:solidFill>
+                  <a:srgbClr val="902000"/>
+                </a:solidFill>
+                <a:latin typeface="Courier"/>
+              </a:rPr>
+              <a:t>colour</a:t>
+            </a:r>
+            <a:r>
+              <a:rPr lang="en-US" sz="1400" dirty="0">
+                <a:solidFill>
+                  <a:srgbClr val="902000"/>
+                </a:solidFill>
+                <a:latin typeface="Courier"/>
+              </a:rPr>
+              <a:t> =</a:t>
+            </a:r>
+            <a:r>
+              <a:rPr lang="en-US" sz="1400" dirty="0">
+                <a:latin typeface="Courier"/>
+              </a:rPr>
+              <a:t> </a:t>
+            </a:r>
+            <a:r>
+              <a:rPr lang="en-US" sz="1400" dirty="0" err="1">
+                <a:latin typeface="Courier"/>
+              </a:rPr>
+              <a:t>project_phase</a:t>
+            </a:r>
+            <a:r>
+              <a:rPr lang="en-US" sz="1400" dirty="0">
+                <a:latin typeface="Courier"/>
+              </a:rPr>
+              <a:t>), </a:t>
+            </a:r>
+            <a:r>
+              <a:rPr lang="en-US" sz="1400" dirty="0">
+                <a:solidFill>
+                  <a:srgbClr val="902000"/>
+                </a:solidFill>
+                <a:latin typeface="Courier"/>
+              </a:rPr>
+              <a:t>size =</a:t>
+            </a:r>
+            <a:r>
+              <a:rPr lang="en-US" sz="1400" dirty="0">
+                <a:latin typeface="Courier"/>
+              </a:rPr>
+              <a:t> </a:t>
+            </a:r>
+            <a:r>
+              <a:rPr lang="en-US" sz="1400" dirty="0">
+                <a:solidFill>
+                  <a:srgbClr val="40A070"/>
+                </a:solidFill>
+                <a:latin typeface="Courier"/>
+              </a:rPr>
+              <a:t>4</a:t>
+            </a:r>
+            <a:r>
+              <a:rPr lang="en-US" sz="1400" dirty="0">
+                <a:latin typeface="Courier"/>
+              </a:rPr>
+              <a:t>) </a:t>
+            </a:r>
+            <a:r>
+              <a:rPr lang="en-US" sz="1400" dirty="0">
+                <a:solidFill>
+                  <a:srgbClr val="666666"/>
+                </a:solidFill>
+                <a:latin typeface="Courier"/>
+              </a:rPr>
+              <a:t>+</a:t>
+            </a:r>
+            <a:br>
+              <a:rPr lang="en-US" sz="1400" dirty="0"/>
+            </a:br>
+            <a:r>
+              <a:rPr lang="en-US" sz="1400" dirty="0">
+                <a:solidFill>
+                  <a:srgbClr val="4070A0"/>
+                </a:solidFill>
+                <a:latin typeface="Courier"/>
+              </a:rPr>
+              <a:t>      </a:t>
+            </a:r>
+            <a:r>
+              <a:rPr lang="en-US" sz="1400" b="1" dirty="0" err="1">
+                <a:solidFill>
+                  <a:srgbClr val="007020"/>
+                </a:solidFill>
+                <a:latin typeface="Courier"/>
+              </a:rPr>
+              <a:t>theme_bw</a:t>
+            </a:r>
+            <a:r>
+              <a:rPr lang="en-US" sz="1400" dirty="0">
+                <a:latin typeface="Courier"/>
+              </a:rPr>
+              <a:t>() </a:t>
+            </a:r>
+            <a:r>
+              <a:rPr lang="en-US" sz="1400" dirty="0">
+                <a:solidFill>
+                  <a:srgbClr val="666666"/>
+                </a:solidFill>
+                <a:latin typeface="Courier"/>
+              </a:rPr>
+              <a:t>+</a:t>
+            </a:r>
+            <a:br>
+              <a:rPr lang="en-US" sz="1400" dirty="0"/>
+            </a:br>
+            <a:r>
+              <a:rPr lang="en-US" sz="1400" dirty="0">
+                <a:solidFill>
+                  <a:srgbClr val="4070A0"/>
+                </a:solidFill>
+                <a:latin typeface="Courier"/>
+              </a:rPr>
+              <a:t>      </a:t>
+            </a:r>
+            <a:r>
+              <a:rPr lang="en-US" sz="1400" b="1" dirty="0" err="1">
+                <a:solidFill>
+                  <a:srgbClr val="007020"/>
+                </a:solidFill>
+                <a:latin typeface="Courier"/>
+              </a:rPr>
+              <a:t>scale_color_manual</a:t>
+            </a:r>
+            <a:r>
+              <a:rPr lang="en-US" sz="1400" dirty="0">
+                <a:latin typeface="Courier"/>
+              </a:rPr>
+              <a:t>(</a:t>
+            </a:r>
+            <a:r>
+              <a:rPr lang="en-US" sz="1400" dirty="0">
+                <a:solidFill>
+                  <a:srgbClr val="902000"/>
+                </a:solidFill>
+                <a:latin typeface="Courier"/>
+              </a:rPr>
+              <a:t>values =</a:t>
+            </a:r>
+            <a:r>
+              <a:rPr lang="en-US" sz="1400" dirty="0">
+                <a:latin typeface="Courier"/>
+              </a:rPr>
+              <a:t> </a:t>
+            </a:r>
+            <a:r>
+              <a:rPr lang="en-US" sz="1400" dirty="0" err="1">
+                <a:latin typeface="Courier"/>
+              </a:rPr>
+              <a:t>mskRvis</a:t>
+            </a:r>
+            <a:r>
+              <a:rPr lang="en-US" sz="1400" dirty="0">
+                <a:solidFill>
+                  <a:srgbClr val="666666"/>
+                </a:solidFill>
+                <a:latin typeface="Courier"/>
+              </a:rPr>
+              <a:t>::</a:t>
+            </a:r>
+            <a:r>
+              <a:rPr lang="en-US" sz="1400" b="1" dirty="0" err="1">
+                <a:solidFill>
+                  <a:srgbClr val="007020"/>
+                </a:solidFill>
+                <a:latin typeface="Courier"/>
+              </a:rPr>
+              <a:t>msk_palette</a:t>
+            </a:r>
+            <a:r>
+              <a:rPr lang="en-US" sz="1400" dirty="0">
+                <a:latin typeface="Courier"/>
+              </a:rPr>
+              <a:t>(</a:t>
+            </a:r>
+            <a:r>
+              <a:rPr lang="en-US" sz="1400" dirty="0">
+                <a:solidFill>
+                  <a:srgbClr val="4070A0"/>
+                </a:solidFill>
+                <a:latin typeface="Courier"/>
+              </a:rPr>
+              <a:t>"contrast"</a:t>
+            </a:r>
+            <a:r>
+              <a:rPr lang="en-US" sz="1400" dirty="0">
+                <a:latin typeface="Courier"/>
+              </a:rPr>
+              <a:t>)) </a:t>
+            </a:r>
+            <a:r>
+              <a:rPr lang="en-US" sz="1400" dirty="0">
+                <a:solidFill>
+                  <a:srgbClr val="666666"/>
+                </a:solidFill>
+                <a:latin typeface="Courier"/>
+              </a:rPr>
+              <a:t>+</a:t>
+            </a:r>
+            <a:r>
+              <a:rPr lang="en-US" sz="1400" dirty="0">
+                <a:solidFill>
+                  <a:srgbClr val="4070A0"/>
+                </a:solidFill>
+                <a:latin typeface="Courier"/>
+              </a:rPr>
+              <a:t> </a:t>
+            </a:r>
+            <a:br>
+              <a:rPr lang="en-US" sz="1400" dirty="0"/>
+            </a:br>
+            <a:r>
+              <a:rPr lang="en-US" sz="1400" dirty="0">
+                <a:solidFill>
+                  <a:srgbClr val="4070A0"/>
+                </a:solidFill>
+                <a:latin typeface="Courier"/>
+              </a:rPr>
+              <a:t>      </a:t>
+            </a:r>
+            <a:r>
+              <a:rPr lang="en-US" sz="1400" b="1" dirty="0">
+                <a:solidFill>
+                  <a:srgbClr val="007020"/>
+                </a:solidFill>
+                <a:latin typeface="Courier"/>
+              </a:rPr>
+              <a:t>theme</a:t>
+            </a:r>
+            <a:r>
+              <a:rPr lang="en-US" sz="1400" dirty="0">
+                <a:latin typeface="Courier"/>
+              </a:rPr>
+              <a:t>(</a:t>
+            </a:r>
+            <a:r>
+              <a:rPr lang="en-US" sz="1400" dirty="0" err="1">
+                <a:solidFill>
+                  <a:srgbClr val="902000"/>
+                </a:solidFill>
+                <a:latin typeface="Courier"/>
+              </a:rPr>
+              <a:t>legend.position</a:t>
+            </a:r>
+            <a:r>
+              <a:rPr lang="en-US" sz="1400" dirty="0">
+                <a:solidFill>
+                  <a:srgbClr val="902000"/>
+                </a:solidFill>
+                <a:latin typeface="Courier"/>
+              </a:rPr>
+              <a:t> =</a:t>
+            </a:r>
+            <a:r>
+              <a:rPr lang="en-US" sz="1400" dirty="0">
+                <a:latin typeface="Courier"/>
+              </a:rPr>
+              <a:t> </a:t>
+            </a:r>
+            <a:r>
+              <a:rPr lang="en-US" sz="1400" dirty="0">
+                <a:solidFill>
+                  <a:srgbClr val="4070A0"/>
+                </a:solidFill>
+                <a:latin typeface="Courier"/>
+              </a:rPr>
+              <a:t>"bottom"</a:t>
+            </a:r>
+            <a:r>
+              <a:rPr lang="en-US" sz="1400" dirty="0">
+                <a:latin typeface="Courier"/>
+              </a:rPr>
+              <a:t>,</a:t>
+            </a:r>
+            <a:br>
+              <a:rPr lang="en-US" sz="1400" dirty="0"/>
+            </a:br>
+            <a:r>
+              <a:rPr lang="en-US" sz="1400" dirty="0">
+                <a:latin typeface="Courier"/>
+              </a:rPr>
+              <a:t>            </a:t>
+            </a:r>
+            <a:r>
+              <a:rPr lang="en-US" sz="1400" dirty="0" err="1">
+                <a:solidFill>
+                  <a:srgbClr val="902000"/>
+                </a:solidFill>
+                <a:latin typeface="Courier"/>
+              </a:rPr>
+              <a:t>legend.title</a:t>
+            </a:r>
+            <a:r>
+              <a:rPr lang="en-US" sz="1400" dirty="0">
+                <a:solidFill>
+                  <a:srgbClr val="902000"/>
+                </a:solidFill>
+                <a:latin typeface="Courier"/>
+              </a:rPr>
+              <a:t> =</a:t>
+            </a:r>
+            <a:r>
+              <a:rPr lang="en-US" sz="1400" dirty="0">
+                <a:latin typeface="Courier"/>
+              </a:rPr>
+              <a:t> </a:t>
+            </a:r>
+            <a:r>
+              <a:rPr lang="en-US" sz="1400" b="1" dirty="0" err="1">
+                <a:solidFill>
+                  <a:srgbClr val="007020"/>
+                </a:solidFill>
+                <a:latin typeface="Courier"/>
+              </a:rPr>
+              <a:t>element_blank</a:t>
+            </a:r>
+            <a:r>
+              <a:rPr lang="en-US" sz="1400" dirty="0">
+                <a:latin typeface="Courier"/>
+              </a:rPr>
+              <a:t>(),</a:t>
+            </a:r>
+            <a:br>
+              <a:rPr lang="en-US" sz="1400" dirty="0"/>
+            </a:br>
+            <a:r>
+              <a:rPr lang="en-US" sz="1400" dirty="0">
+                <a:latin typeface="Courier"/>
+              </a:rPr>
+              <a:t>            </a:t>
+            </a:r>
+            <a:r>
+              <a:rPr lang="en-US" sz="1400" dirty="0" err="1">
+                <a:solidFill>
+                  <a:srgbClr val="902000"/>
+                </a:solidFill>
+                <a:latin typeface="Courier"/>
+              </a:rPr>
+              <a:t>axis.title</a:t>
+            </a:r>
+            <a:r>
+              <a:rPr lang="en-US" sz="1400" dirty="0">
+                <a:solidFill>
+                  <a:srgbClr val="902000"/>
+                </a:solidFill>
+                <a:latin typeface="Courier"/>
+              </a:rPr>
+              <a:t> =</a:t>
+            </a:r>
+            <a:r>
+              <a:rPr lang="en-US" sz="1400" dirty="0">
+                <a:latin typeface="Courier"/>
+              </a:rPr>
+              <a:t> </a:t>
+            </a:r>
+            <a:r>
+              <a:rPr lang="en-US" sz="1400" b="1" dirty="0" err="1">
+                <a:solidFill>
+                  <a:srgbClr val="007020"/>
+                </a:solidFill>
+                <a:latin typeface="Courier"/>
+              </a:rPr>
+              <a:t>element_blank</a:t>
+            </a:r>
+            <a:r>
+              <a:rPr lang="en-US" sz="1400" dirty="0">
+                <a:latin typeface="Courier"/>
+              </a:rPr>
+              <a:t>(), </a:t>
+            </a:r>
+            <a:br>
+              <a:rPr lang="en-US" sz="1400" dirty="0"/>
+            </a:br>
+            <a:r>
+              <a:rPr lang="en-US" sz="1400" dirty="0">
+                <a:latin typeface="Courier"/>
+              </a:rPr>
+              <a:t>            </a:t>
+            </a:r>
+            <a:r>
+              <a:rPr lang="en-US" sz="1400" dirty="0" err="1">
+                <a:solidFill>
+                  <a:srgbClr val="902000"/>
+                </a:solidFill>
+                <a:latin typeface="Courier"/>
+              </a:rPr>
+              <a:t>axis.ticks</a:t>
+            </a:r>
+            <a:r>
+              <a:rPr lang="en-US" sz="1400" dirty="0">
+                <a:solidFill>
+                  <a:srgbClr val="902000"/>
+                </a:solidFill>
+                <a:latin typeface="Courier"/>
+              </a:rPr>
+              <a:t> =</a:t>
+            </a:r>
+            <a:r>
+              <a:rPr lang="en-US" sz="1400" dirty="0">
+                <a:latin typeface="Courier"/>
+              </a:rPr>
+              <a:t> </a:t>
+            </a:r>
+            <a:r>
+              <a:rPr lang="en-US" sz="1400" b="1" dirty="0" err="1">
+                <a:solidFill>
+                  <a:srgbClr val="007020"/>
+                </a:solidFill>
+                <a:latin typeface="Courier"/>
+              </a:rPr>
+              <a:t>element_blank</a:t>
+            </a:r>
+            <a:r>
+              <a:rPr lang="en-US" sz="1400" dirty="0">
+                <a:latin typeface="Courier"/>
+              </a:rPr>
+              <a:t>()) </a:t>
+            </a:r>
+            <a:r>
+              <a:rPr lang="en-US" sz="1400" dirty="0">
+                <a:solidFill>
+                  <a:srgbClr val="666666"/>
+                </a:solidFill>
+                <a:latin typeface="Courier"/>
+              </a:rPr>
+              <a:t>+</a:t>
+            </a:r>
+            <a:br>
+              <a:rPr lang="en-US" sz="1400" dirty="0"/>
+            </a:br>
+            <a:r>
+              <a:rPr lang="en-US" sz="1400" dirty="0">
+                <a:solidFill>
+                  <a:srgbClr val="4070A0"/>
+                </a:solidFill>
+                <a:latin typeface="Courier"/>
+              </a:rPr>
+              <a:t>      </a:t>
+            </a:r>
+            <a:r>
+              <a:rPr lang="en-US" sz="1400" b="1" dirty="0" err="1">
+                <a:solidFill>
+                  <a:srgbClr val="007020"/>
+                </a:solidFill>
+                <a:latin typeface="Courier"/>
+              </a:rPr>
+              <a:t>scale_x_date</a:t>
+            </a:r>
+            <a:r>
+              <a:rPr lang="en-US" sz="1400" dirty="0">
+                <a:latin typeface="Courier"/>
+              </a:rPr>
+              <a:t>(</a:t>
+            </a:r>
+            <a:r>
+              <a:rPr lang="en-US" sz="1400" dirty="0">
+                <a:solidFill>
+                  <a:srgbClr val="902000"/>
+                </a:solidFill>
+                <a:latin typeface="Courier"/>
+              </a:rPr>
+              <a:t>breaks =</a:t>
+            </a:r>
+            <a:r>
+              <a:rPr lang="en-US" sz="1400" dirty="0">
+                <a:latin typeface="Courier"/>
+              </a:rPr>
+              <a:t> </a:t>
+            </a:r>
+            <a:r>
+              <a:rPr lang="en-US" sz="1400" dirty="0">
+                <a:solidFill>
+                  <a:srgbClr val="4070A0"/>
+                </a:solidFill>
+                <a:latin typeface="Courier"/>
+              </a:rPr>
+              <a:t>"3 months"</a:t>
+            </a:r>
+            <a:r>
+              <a:rPr lang="en-US" sz="1400" dirty="0">
+                <a:latin typeface="Courier"/>
+              </a:rPr>
+              <a:t>, </a:t>
+            </a:r>
+            <a:r>
+              <a:rPr lang="en-US" sz="1400" dirty="0" err="1">
+                <a:solidFill>
+                  <a:srgbClr val="902000"/>
+                </a:solidFill>
+                <a:latin typeface="Courier"/>
+              </a:rPr>
+              <a:t>date_labels</a:t>
+            </a:r>
+            <a:r>
+              <a:rPr lang="en-US" sz="1400" dirty="0">
+                <a:solidFill>
+                  <a:srgbClr val="902000"/>
+                </a:solidFill>
+                <a:latin typeface="Courier"/>
+              </a:rPr>
+              <a:t> =</a:t>
+            </a:r>
+            <a:r>
+              <a:rPr lang="en-US" sz="1400" dirty="0">
+                <a:latin typeface="Courier"/>
+              </a:rPr>
+              <a:t> </a:t>
+            </a:r>
+            <a:r>
+              <a:rPr lang="en-US" sz="1400" dirty="0">
+                <a:solidFill>
+                  <a:srgbClr val="4070A0"/>
+                </a:solidFill>
+                <a:latin typeface="Courier"/>
+              </a:rPr>
+              <a:t>"%b %Y"</a:t>
+            </a:r>
+            <a:r>
+              <a:rPr lang="en-US" sz="1400" dirty="0">
+                <a:latin typeface="Courier"/>
+              </a:rPr>
+              <a:t>) </a:t>
+            </a:r>
+            <a:endParaRPr lang="en-US" sz="1400" dirty="0"/>
+          </a:p>
+        </p:txBody>
+      </p:sp>
+      <p:pic>
+        <p:nvPicPr>
+          <p:cNvPr id="5" name="Picture 4">
+            <a:extLst>
+              <a:ext uri="{FF2B5EF4-FFF2-40B4-BE49-F238E27FC236}">
+                <a16:creationId xmlns:a16="http://schemas.microsoft.com/office/drawing/2014/main" id="{36F56087-CEFB-4826-AFA8-77D4A910A7C9}"/>
+              </a:ext>
+            </a:extLst>
+          </p:cNvPr>
+          <p:cNvPicPr>
+            <a:picLocks noChangeAspect="1"/>
+          </p:cNvPicPr>
+          <p:nvPr/>
+        </p:nvPicPr>
+        <p:blipFill>
+          <a:blip r:embed="rId2"/>
+          <a:stretch>
+            <a:fillRect/>
+          </a:stretch>
+        </p:blipFill>
+        <p:spPr>
+          <a:xfrm>
+            <a:off x="1253511" y="3771438"/>
+            <a:ext cx="7191989" cy="3005779"/>
+          </a:xfrm>
+          <a:prstGeom prst="rect">
+            <a:avLst/>
+          </a:prstGeom>
+        </p:spPr>
+      </p:pic>
+    </p:spTree>
+    <p:extLst>
+      <p:ext uri="{BB962C8B-B14F-4D97-AF65-F5344CB8AC3E}">
+        <p14:creationId xmlns:p14="http://schemas.microsoft.com/office/powerpoint/2010/main" val="2632600419"/>
+      </p:ext>
+    </p:extLst>
+  </p:cSld>
+  <p:clrMapOvr>
+    <a:masterClrMapping/>
+  </p:clrMapOvr>
+</p:sld>
+</file>
+
+<file path=ppt/slides/slide34.xml><?xml version="1.0" encoding="utf-8"?>
 <p:sld xmlns:a="http://schemas.openxmlformats.org/drawingml/2006/main" xmlns:r="http://schemas.openxmlformats.org/officeDocument/2006/relationships" xmlns:p="http://schemas.openxmlformats.org/presentationml/2006/main">
   <p:cSld>
     <p:spTree>
@@ -9045,6 +10674,14 @@
             </a:r>
           </a:p>
           <a:p>
+            <a:pPr lvl="1"/>
+            <a:r>
+              <a:rPr lang="en-US" sz="2000" dirty="0"/>
+              <a:t>Won’t tell you if you spent 2 hours on Twitter or 45 minutes replying to an email (unless you write that down yourself!)</a:t>
+            </a:r>
+            <a:endParaRPr lang="en-US" sz="2000" i="1" dirty="0"/>
+          </a:p>
+          <a:p>
             <a:r>
               <a:rPr lang="en-US" sz="2400" dirty="0"/>
               <a:t>Corollary: this is only useful if you track your time relatively accurately</a:t>
@@ -9054,6 +10691,13 @@
             <a:pPr lvl="1"/>
             <a:r>
               <a:rPr lang="en-US" sz="2000" dirty="0"/>
+              <a:t>Tracks by number of hours, not time of day</a:t>
+            </a:r>
+          </a:p>
+          <a:p>
+            <a:pPr lvl="1"/>
+            <a:r>
+              <a:rPr lang="en-US" sz="2000" dirty="0"/>
               <a:t>15 minute increments at a minimum, sometimes record a single project or activity for an entire day</a:t>
             </a:r>
           </a:p>
@@ -9068,13 +10712,6 @@
             <a:r>
               <a:rPr lang="en-US" sz="2400" dirty="0"/>
               <a:t>Entirely retrospective: it’s a summary of what you’ve done, doesn’t include projected time allocations</a:t>
-            </a:r>
-          </a:p>
-          <a:p>
-            <a:pPr lvl="1"/>
-            <a:r>
-              <a:rPr lang="en-US" sz="2000" dirty="0"/>
-              <a:t>Won’t tell you if you spent 2 hours on Twitter or 45 minutes replying to an email (unless you write that down yourself!)</a:t>
             </a:r>
           </a:p>
         </p:txBody>
@@ -9092,7 +10729,7 @@
 </p:sld>
 </file>
 
-<file path=ppt/slides/slide28.xml><?xml version="1.0" encoding="utf-8"?>
+<file path=ppt/slides/slide35.xml><?xml version="1.0" encoding="utf-8"?>
 <p:sld xmlns:a="http://schemas.openxmlformats.org/drawingml/2006/main" xmlns:r="http://schemas.openxmlformats.org/officeDocument/2006/relationships" xmlns:p="http://schemas.openxmlformats.org/presentationml/2006/main">
   <p:cSld>
     <p:spTree>
@@ -9132,7 +10769,7 @@
           <a:p>
             <a:r>
               <a:rPr lang="en-US" dirty="0"/>
-              <a:t>Summary</a:t>
+              <a:t>Future Plans</a:t>
             </a:r>
           </a:p>
         </p:txBody>
@@ -9159,8 +10796,127 @@
           <a:lstStyle/>
           <a:p>
             <a:r>
+              <a:rPr lang="en-US" sz="2800" dirty="0"/>
+              <a:t>Incorporate with Toggl app (or others) to automate a portion of the tracking</a:t>
+            </a:r>
+          </a:p>
+          <a:p>
+            <a:pPr lvl="1"/>
+            <a:r>
               <a:rPr lang="en-US" sz="2400" dirty="0"/>
-              <a:t>Very few metrics are needed to gain an understanding of how you’re spending your time</a:t>
+              <a:t>Automated time tracking + customizable reporting = best of both worlds?</a:t>
+            </a:r>
+          </a:p>
+          <a:p>
+            <a:r>
+              <a:rPr lang="en-US" sz="2800" dirty="0"/>
+              <a:t>Incorporate additional visualizations and/or summary measures</a:t>
+            </a:r>
+          </a:p>
+          <a:p>
+            <a:pPr lvl="1"/>
+            <a:r>
+              <a:rPr lang="en-US" sz="2400" dirty="0"/>
+              <a:t>Changes over time?</a:t>
+            </a:r>
+          </a:p>
+          <a:p>
+            <a:pPr lvl="1"/>
+            <a:r>
+              <a:rPr lang="en-US" sz="2400" dirty="0"/>
+              <a:t>Suggestions?</a:t>
+            </a:r>
+          </a:p>
+        </p:txBody>
+      </p:sp>
+    </p:spTree>
+    <p:extLst>
+      <p:ext uri="{BB962C8B-B14F-4D97-AF65-F5344CB8AC3E}">
+        <p14:creationId xmlns:p14="http://schemas.microsoft.com/office/powerpoint/2010/main" val="1472678012"/>
+      </p:ext>
+    </p:extLst>
+  </p:cSld>
+  <p:clrMapOvr>
+    <a:masterClrMapping/>
+  </p:clrMapOvr>
+</p:sld>
+</file>
+
+<file path=ppt/slides/slide36.xml><?xml version="1.0" encoding="utf-8"?>
+<p:sld xmlns:a="http://schemas.openxmlformats.org/drawingml/2006/main" xmlns:r="http://schemas.openxmlformats.org/officeDocument/2006/relationships" xmlns:p="http://schemas.openxmlformats.org/presentationml/2006/main">
+  <p:cSld>
+    <p:spTree>
+      <p:nvGrpSpPr>
+        <p:cNvPr id="1" name=""/>
+        <p:cNvGrpSpPr/>
+        <p:nvPr/>
+      </p:nvGrpSpPr>
+      <p:grpSpPr>
+        <a:xfrm>
+          <a:off x="0" y="0"/>
+          <a:ext cx="0" cy="0"/>
+          <a:chOff x="0" y="0"/>
+          <a:chExt cx="0" cy="0"/>
+        </a:xfrm>
+      </p:grpSpPr>
+      <p:sp>
+        <p:nvSpPr>
+          <p:cNvPr id="2" name="Title 1">
+            <a:extLst>
+              <a:ext uri="{FF2B5EF4-FFF2-40B4-BE49-F238E27FC236}">
+                <a16:creationId xmlns:a16="http://schemas.microsoft.com/office/drawing/2014/main" id="{8B4B5790-0EA7-4012-93A7-22425D41E1E3}"/>
+              </a:ext>
+            </a:extLst>
+          </p:cNvPr>
+          <p:cNvSpPr>
+            <a:spLocks noGrp="1"/>
+          </p:cNvSpPr>
+          <p:nvPr>
+            <p:ph type="title"/>
+          </p:nvPr>
+        </p:nvSpPr>
+        <p:spPr/>
+        <p:txBody>
+          <a:bodyPr/>
+          <a:lstStyle/>
+          <a:p>
+            <a:r>
+              <a:rPr lang="en-US" dirty="0"/>
+              <a:t>Summary</a:t>
+            </a:r>
+          </a:p>
+        </p:txBody>
+      </p:sp>
+      <p:sp>
+        <p:nvSpPr>
+          <p:cNvPr id="3" name="Content Placeholder 2">
+            <a:extLst>
+              <a:ext uri="{FF2B5EF4-FFF2-40B4-BE49-F238E27FC236}">
+                <a16:creationId xmlns:a16="http://schemas.microsoft.com/office/drawing/2014/main" id="{4851F475-9DB2-4FC0-B370-DDE4324E134A}"/>
+              </a:ext>
+            </a:extLst>
+          </p:cNvPr>
+          <p:cNvSpPr>
+            <a:spLocks noGrp="1"/>
+          </p:cNvSpPr>
+          <p:nvPr>
+            <p:ph idx="1"/>
+          </p:nvPr>
+        </p:nvSpPr>
+        <p:spPr/>
+        <p:txBody>
+          <a:bodyPr/>
+          <a:lstStyle/>
+          <a:p>
+            <a:r>
+              <a:rPr lang="en-US" sz="2400" dirty="0"/>
+              <a:t>Very few metrics are needed to gain a general understanding of how you’re spending your time</a:t>
+            </a:r>
+          </a:p>
+          <a:p>
+            <a:r>
+              <a:rPr lang="en-US" sz="2400" dirty="0"/>
+              <a:t>Can be used to track time across a team or to look at your own time</a:t>
             </a:r>
           </a:p>
           <a:p>
@@ -9175,12 +10931,6 @@
             <a:r>
               <a:rPr lang="en-US" sz="2400" dirty="0"/>
               <a:t> to spend your time</a:t>
-            </a:r>
-          </a:p>
-          <a:p>
-            <a:r>
-              <a:rPr lang="en-US" sz="2400" dirty="0"/>
-              <a:t>Can be used to track time across a team or to look at your own time</a:t>
             </a:r>
           </a:p>
         </p:txBody>
@@ -9245,235 +10995,7 @@
 </p:sld>
 </file>
 
-<file path=ppt/slides/slide29.xml><?xml version="1.0" encoding="utf-8"?>
-<p:sld xmlns:a="http://schemas.openxmlformats.org/drawingml/2006/main" xmlns:r="http://schemas.openxmlformats.org/officeDocument/2006/relationships" xmlns:p="http://schemas.openxmlformats.org/presentationml/2006/main">
-  <p:cSld>
-    <p:spTree>
-      <p:nvGrpSpPr>
-        <p:cNvPr id="1" name=""/>
-        <p:cNvGrpSpPr/>
-        <p:nvPr/>
-      </p:nvGrpSpPr>
-      <p:grpSpPr>
-        <a:xfrm>
-          <a:off x="0" y="0"/>
-          <a:ext cx="0" cy="0"/>
-          <a:chOff x="0" y="0"/>
-          <a:chExt cx="0" cy="0"/>
-        </a:xfrm>
-      </p:grpSpPr>
-      <p:sp>
-        <p:nvSpPr>
-          <p:cNvPr id="2" name="Title 1">
-            <a:extLst>
-              <a:ext uri="{FF2B5EF4-FFF2-40B4-BE49-F238E27FC236}">
-                <a16:creationId xmlns:a16="http://schemas.microsoft.com/office/drawing/2014/main" id="{8B4B5790-0EA7-4012-93A7-22425D41E1E3}"/>
-              </a:ext>
-            </a:extLst>
-          </p:cNvPr>
-          <p:cNvSpPr>
-            <a:spLocks noGrp="1"/>
-          </p:cNvSpPr>
-          <p:nvPr>
-            <p:ph type="title"/>
-          </p:nvPr>
-        </p:nvSpPr>
-        <p:spPr/>
-        <p:txBody>
-          <a:bodyPr/>
-          <a:lstStyle/>
-          <a:p>
-            <a:r>
-              <a:rPr lang="en-US" dirty="0"/>
-              <a:t>Future Plans</a:t>
-            </a:r>
-          </a:p>
-        </p:txBody>
-      </p:sp>
-      <p:sp>
-        <p:nvSpPr>
-          <p:cNvPr id="3" name="Content Placeholder 2">
-            <a:extLst>
-              <a:ext uri="{FF2B5EF4-FFF2-40B4-BE49-F238E27FC236}">
-                <a16:creationId xmlns:a16="http://schemas.microsoft.com/office/drawing/2014/main" id="{4851F475-9DB2-4FC0-B370-DDE4324E134A}"/>
-              </a:ext>
-            </a:extLst>
-          </p:cNvPr>
-          <p:cNvSpPr>
-            <a:spLocks noGrp="1"/>
-          </p:cNvSpPr>
-          <p:nvPr>
-            <p:ph idx="1"/>
-          </p:nvPr>
-        </p:nvSpPr>
-        <p:spPr/>
-        <p:txBody>
-          <a:bodyPr/>
-          <a:lstStyle/>
-          <a:p>
-            <a:r>
-              <a:rPr lang="en-US" sz="2800" dirty="0"/>
-              <a:t>Incorporate with Toggl app (or others) to automate a portion of the tracking</a:t>
-            </a:r>
-          </a:p>
-          <a:p>
-            <a:pPr lvl="1"/>
-            <a:r>
-              <a:rPr lang="en-US" sz="2400" dirty="0"/>
-              <a:t>Automated time tracking + customizable reporting = best of both worlds?</a:t>
-            </a:r>
-          </a:p>
-          <a:p>
-            <a:r>
-              <a:rPr lang="en-US" sz="2800" dirty="0"/>
-              <a:t>Incorporate additional visualizations and/or summary measures</a:t>
-            </a:r>
-          </a:p>
-          <a:p>
-            <a:pPr lvl="1"/>
-            <a:r>
-              <a:rPr lang="en-US" sz="2400" dirty="0"/>
-              <a:t>Changes over time?</a:t>
-            </a:r>
-          </a:p>
-          <a:p>
-            <a:pPr lvl="1"/>
-            <a:r>
-              <a:rPr lang="en-US" sz="2400" dirty="0"/>
-              <a:t>Suggestions?</a:t>
-            </a:r>
-          </a:p>
-        </p:txBody>
-      </p:sp>
-    </p:spTree>
-    <p:extLst>
-      <p:ext uri="{BB962C8B-B14F-4D97-AF65-F5344CB8AC3E}">
-        <p14:creationId xmlns:p14="http://schemas.microsoft.com/office/powerpoint/2010/main" val="1472678012"/>
-      </p:ext>
-    </p:extLst>
-  </p:cSld>
-  <p:clrMapOvr>
-    <a:masterClrMapping/>
-  </p:clrMapOvr>
-</p:sld>
-</file>
-
-<file path=ppt/slides/slide3.xml><?xml version="1.0" encoding="utf-8"?>
-<p:sld xmlns:a="http://schemas.openxmlformats.org/drawingml/2006/main" xmlns:r="http://schemas.openxmlformats.org/officeDocument/2006/relationships" xmlns:p="http://schemas.openxmlformats.org/presentationml/2006/main">
-  <p:cSld>
-    <p:spTree>
-      <p:nvGrpSpPr>
-        <p:cNvPr id="1" name=""/>
-        <p:cNvGrpSpPr/>
-        <p:nvPr/>
-      </p:nvGrpSpPr>
-      <p:grpSpPr>
-        <a:xfrm>
-          <a:off x="0" y="0"/>
-          <a:ext cx="0" cy="0"/>
-          <a:chOff x="0" y="0"/>
-          <a:chExt cx="0" cy="0"/>
-        </a:xfrm>
-      </p:grpSpPr>
-      <p:sp>
-        <p:nvSpPr>
-          <p:cNvPr id="2" name="Title 1">
-            <a:extLst>
-              <a:ext uri="{FF2B5EF4-FFF2-40B4-BE49-F238E27FC236}">
-                <a16:creationId xmlns:a16="http://schemas.microsoft.com/office/drawing/2014/main" id="{7CCFB932-F1A0-458A-830D-3BBD6D4ACBAC}"/>
-              </a:ext>
-            </a:extLst>
-          </p:cNvPr>
-          <p:cNvSpPr>
-            <a:spLocks noGrp="1"/>
-          </p:cNvSpPr>
-          <p:nvPr>
-            <p:ph type="title"/>
-          </p:nvPr>
-        </p:nvSpPr>
-        <p:spPr/>
-        <p:txBody>
-          <a:bodyPr/>
-          <a:lstStyle/>
-          <a:p>
-            <a:r>
-              <a:rPr lang="en-US" dirty="0"/>
-              <a:t>Why use a time tracker summary app?</a:t>
-            </a:r>
-          </a:p>
-        </p:txBody>
-      </p:sp>
-      <p:sp>
-        <p:nvSpPr>
-          <p:cNvPr id="3" name="Content Placeholder 2">
-            <a:extLst>
-              <a:ext uri="{FF2B5EF4-FFF2-40B4-BE49-F238E27FC236}">
-                <a16:creationId xmlns:a16="http://schemas.microsoft.com/office/drawing/2014/main" id="{5640F286-9FC2-4C24-9810-0AD9959C4F7C}"/>
-              </a:ext>
-            </a:extLst>
-          </p:cNvPr>
-          <p:cNvSpPr>
-            <a:spLocks noGrp="1"/>
-          </p:cNvSpPr>
-          <p:nvPr>
-            <p:ph idx="1"/>
-          </p:nvPr>
-        </p:nvSpPr>
-        <p:spPr/>
-        <p:txBody>
-          <a:bodyPr/>
-          <a:lstStyle/>
-          <a:p>
-            <a:r>
-              <a:rPr lang="en-US" sz="2800" i="1" dirty="0">
-                <a:solidFill>
-                  <a:schemeClr val="accent1"/>
-                </a:solidFill>
-              </a:rPr>
-              <a:t>It’s hard to manage your time if you don’t know how you’re spending your time</a:t>
-            </a:r>
-          </a:p>
-          <a:p>
-            <a:r>
-              <a:rPr lang="en-US" sz="2800" dirty="0"/>
-              <a:t>Recall is often inaccurate</a:t>
-            </a:r>
-          </a:p>
-          <a:p>
-            <a:pPr lvl="1"/>
-            <a:r>
-              <a:rPr lang="en-US" sz="2400" dirty="0"/>
-              <a:t>Feels like we spend a lot of time on projects we don’t love and not enough time on projects we do</a:t>
-            </a:r>
-          </a:p>
-          <a:p>
-            <a:r>
-              <a:rPr lang="en-US" sz="2800" dirty="0"/>
-              <a:t>Useful for goal-setting and evaluating</a:t>
-            </a:r>
-          </a:p>
-          <a:p>
-            <a:r>
-              <a:rPr lang="en-US" sz="2800" dirty="0"/>
-              <a:t>Aids in forecasting/resource allocation decisions</a:t>
-            </a:r>
-          </a:p>
-        </p:txBody>
-      </p:sp>
-    </p:spTree>
-    <p:extLst>
-      <p:ext uri="{BB962C8B-B14F-4D97-AF65-F5344CB8AC3E}">
-        <p14:creationId xmlns:p14="http://schemas.microsoft.com/office/powerpoint/2010/main" val="1628145875"/>
-      </p:ext>
-    </p:extLst>
-  </p:cSld>
-  <p:clrMapOvr>
-    <a:masterClrMapping/>
-  </p:clrMapOvr>
-</p:sld>
-</file>
-
-<file path=ppt/slides/slide30.xml><?xml version="1.0" encoding="utf-8"?>
+<file path=ppt/slides/slide37.xml><?xml version="1.0" encoding="utf-8"?>
 <p:sld xmlns:a="http://schemas.openxmlformats.org/drawingml/2006/main" xmlns:r="http://schemas.openxmlformats.org/officeDocument/2006/relationships" xmlns:p="http://schemas.openxmlformats.org/presentationml/2006/main">
   <p:cSld>
     <p:spTree>
@@ -9996,7 +11518,7 @@
         <p:spPr>
           <a:xfrm>
             <a:off x="5532300" y="4671322"/>
-            <a:ext cx="3466293" cy="1569660"/>
+            <a:ext cx="3466293" cy="1384995"/>
           </a:xfrm>
           <a:prstGeom prst="rect">
             <a:avLst/>
@@ -10020,7 +11542,7 @@
           <a:p>
             <a:r>
               <a:rPr lang="en-US" sz="1200" i="1" dirty="0"/>
-              <a:t>Thanks also to Mike Curry for letting me share his time tracking data and his patience in answering my many R questions. It’s a good thing he doesn’t track his time spent doing so! </a:t>
+              <a:t>Thanks also to Mike Curry for letting me share his time tracking data and his patience in answering my many R questions. </a:t>
             </a:r>
           </a:p>
         </p:txBody>
@@ -10339,40 +11861,68 @@
           <a:lstStyle/>
           <a:p>
             <a:r>
-              <a:rPr lang="en-US" dirty="0"/>
-              <a:t>On a team of 3 statisticians</a:t>
+              <a:rPr lang="en-US" sz="2400" dirty="0"/>
+              <a:t>On a team of 3 statisticians at the time</a:t>
             </a:r>
           </a:p>
           <a:p>
             <a:pPr lvl="1"/>
             <a:r>
-              <a:rPr lang="en-US" dirty="0"/>
+              <a:rPr lang="en-US" sz="2000" dirty="0"/>
               <a:t>Overlap in projects and investigators</a:t>
             </a:r>
           </a:p>
           <a:p>
             <a:pPr lvl="1"/>
             <a:r>
-              <a:rPr lang="en-US" dirty="0"/>
+              <a:rPr lang="en-US" sz="2000" dirty="0"/>
               <a:t>Track individually or in aggregate</a:t>
             </a:r>
           </a:p>
           <a:p>
             <a:r>
-              <a:rPr lang="en-US" dirty="0"/>
+              <a:rPr lang="en-US" sz="2400" dirty="0"/>
               <a:t>Wanted experience with R &amp; Shiny</a:t>
             </a:r>
           </a:p>
           <a:p>
-            <a:r>
-              <a:rPr lang="en-US" dirty="0"/>
+            <a:pPr lvl="1"/>
+            <a:r>
+              <a:rPr lang="en-US" sz="2000" dirty="0"/>
+              <a:t>Used previous </a:t>
+            </a:r>
+            <a:r>
+              <a:rPr lang="en-US" sz="2000" dirty="0" err="1"/>
+              <a:t>RLadies</a:t>
+            </a:r>
+            <a:r>
+              <a:rPr lang="en-US" sz="2000" dirty="0"/>
+              <a:t> presentation to get started: </a:t>
+            </a:r>
+            <a:r>
+              <a:rPr lang="en-US" sz="2000" i="1" dirty="0">
+                <a:hlinkClick r:id="rId2"/>
+              </a:rPr>
+              <a:t>Learning Shiny with NBA data</a:t>
+            </a:r>
+            <a:endParaRPr lang="en-US" sz="2000" i="1" dirty="0"/>
+          </a:p>
+          <a:p>
+            <a:r>
+              <a:rPr lang="en-US" sz="2400" dirty="0"/>
+              <a:t>Wanted simple, easily interpretable metrics/visualization – didn’t want to spend all of my time analyzing my time</a:t>
+            </a:r>
+          </a:p>
+          <a:p>
+            <a:r>
+              <a:rPr lang="en-US" sz="2400" dirty="0"/>
               <a:t>Project based work:</a:t>
             </a:r>
           </a:p>
           <a:p>
             <a:pPr lvl="1"/>
             <a:r>
-              <a:rPr lang="en-US" dirty="0"/>
+              <a:rPr lang="en-US" sz="2000" dirty="0"/>
               <a:t>Principal Investigator / Project</a:t>
             </a:r>
           </a:p>

</xml_diff>

<commit_message>
minor edits to presentation, remove titles on pie chart
</commit_message>
<xml_diff>
--- a/RLadies timetrackR Presentation.pptx
+++ b/RLadies timetrackR Presentation.pptx
@@ -2850,7 +2850,7 @@
           <a:p>
             <a:fld id="{DA61AB23-0316-4A6A-B29B-19F469FB1971}" type="datetimeFigureOut">
               <a:rPr lang="en-US" smtClean="0"/>
-              <a:t>2/25/20</a:t>
+              <a:t>2/26/20</a:t>
             </a:fld>
             <a:endParaRPr lang="en-US"/>
           </a:p>
@@ -3028,7 +3028,7 @@
           <a:p>
             <a:fld id="{7F6DE0E8-87C7-4A14-9F3C-CD4E49706B18}" type="datetimeFigureOut">
               <a:rPr lang="en-US" smtClean="0"/>
-              <a:t>2/25/20</a:t>
+              <a:t>2/26/20</a:t>
             </a:fld>
             <a:endParaRPr lang="en-US"/>
           </a:p>
@@ -6732,17 +6732,17 @@
           </a:ln>
           <a:extLst>
             <a:ext uri="{FAA26D3D-D897-4be2-8F04-BA451C77F1D7}">
-              <ma14:placeholderFlag xmlns="" xmlns:ma14="http://schemas.microsoft.com/office/mac/drawingml/2011/main" val="1"/>
+              <ma14:placeholderFlag xmlns:ma14="http://schemas.microsoft.com/office/mac/drawingml/2011/main" xmlns="" val="1"/>
             </a:ext>
             <a:ext uri="{909E8E84-426E-40dd-AFC4-6F175D3DCCD1}">
-              <a14:hiddenFill xmlns="" xmlns:a14="http://schemas.microsoft.com/office/drawing/2010/main">
+              <a14:hiddenFill xmlns:a14="http://schemas.microsoft.com/office/drawing/2010/main" xmlns="">
                 <a:solidFill>
                   <a:srgbClr val="FFFFFF"/>
                 </a:solidFill>
               </a14:hiddenFill>
             </a:ext>
             <a:ext uri="{91240B29-F687-4f45-9708-019B960494DF}">
-              <a14:hiddenLine xmlns="" xmlns:a14="http://schemas.microsoft.com/office/drawing/2010/main" w="9525">
+              <a14:hiddenLine xmlns:a14="http://schemas.microsoft.com/office/drawing/2010/main" xmlns="" w="9525">
                 <a:solidFill>
                   <a:srgbClr val="000000"/>
                 </a:solidFill>
@@ -6794,17 +6794,17 @@
           </a:ln>
           <a:extLst>
             <a:ext uri="{FAA26D3D-D897-4be2-8F04-BA451C77F1D7}">
-              <ma14:placeholderFlag xmlns="" xmlns:ma14="http://schemas.microsoft.com/office/mac/drawingml/2011/main" val="1"/>
+              <ma14:placeholderFlag xmlns:ma14="http://schemas.microsoft.com/office/mac/drawingml/2011/main" xmlns="" val="1"/>
             </a:ext>
             <a:ext uri="{909E8E84-426E-40dd-AFC4-6F175D3DCCD1}">
-              <a14:hiddenFill xmlns="" xmlns:a14="http://schemas.microsoft.com/office/drawing/2010/main">
+              <a14:hiddenFill xmlns:a14="http://schemas.microsoft.com/office/drawing/2010/main" xmlns="">
                 <a:solidFill>
                   <a:srgbClr val="FFFFFF"/>
                 </a:solidFill>
               </a14:hiddenFill>
             </a:ext>
             <a:ext uri="{91240B29-F687-4f45-9708-019B960494DF}">
-              <a14:hiddenLine xmlns="" xmlns:a14="http://schemas.microsoft.com/office/drawing/2010/main" w="9525">
+              <a14:hiddenLine xmlns:a14="http://schemas.microsoft.com/office/drawing/2010/main" xmlns="" w="9525">
                 <a:solidFill>
                   <a:srgbClr val="000000"/>
                 </a:solidFill>
@@ -7957,7 +7957,7 @@
             </a:r>
             <a:r>
               <a:rPr lang="en-US" sz="2800" dirty="0"/>
-              <a:t>: Time spent per project/investigator/task</a:t>
+              <a:t>: Time spent per project/investigator/project phase</a:t>
             </a:r>
           </a:p>
           <a:p>
@@ -7982,7 +7982,7 @@
             </a:r>
             <a:r>
               <a:rPr lang="en-US" sz="2800" dirty="0"/>
-              <a:t>: Cumulative total number of hours spent on a project</a:t>
+              <a:t>: Cumulative number of hours spent on a project</a:t>
             </a:r>
           </a:p>
           <a:p>
@@ -8185,30 +8185,6 @@
                   <a:schemeClr val="accent2"/>
                 </a:solidFill>
               </a:rPr>
-              <a:t>Comparing time invested to products generated</a:t>
-            </a:r>
-          </a:p>
-          <a:p>
-            <a:pPr lvl="1"/>
-            <a:r>
-              <a:rPr lang="en-US" sz="1600" dirty="0"/>
-              <a:t>Did an abstract take as long as a full analysis for a manuscript?</a:t>
-            </a:r>
-          </a:p>
-          <a:p>
-            <a:pPr lvl="1"/>
-            <a:r>
-              <a:rPr lang="en-US" sz="1600" dirty="0"/>
-              <a:t>For a time-intensive project, was the result multiple manuscripts? </a:t>
-            </a:r>
-          </a:p>
-          <a:p>
-            <a:r>
-              <a:rPr lang="en-US" sz="2000" dirty="0">
-                <a:solidFill>
-                  <a:schemeClr val="accent2"/>
-                </a:solidFill>
-              </a:rPr>
               <a:t>Protecting your time</a:t>
             </a:r>
           </a:p>
@@ -8347,31 +8323,55 @@
           <a:lstStyle/>
           <a:p>
             <a:r>
-              <a:rPr lang="en-US" sz="2400" dirty="0">
+              <a:rPr lang="en-US" sz="2000" dirty="0">
                 <a:solidFill>
                   <a:schemeClr val="accent2"/>
                 </a:solidFill>
               </a:rPr>
+              <a:t>Comparing time invested to products generated</a:t>
+            </a:r>
+          </a:p>
+          <a:p>
+            <a:pPr lvl="1"/>
+            <a:r>
+              <a:rPr lang="en-US" sz="1800" dirty="0"/>
+              <a:t>Did an abstract take as long as a full analysis for a manuscript?</a:t>
+            </a:r>
+          </a:p>
+          <a:p>
+            <a:pPr lvl="1"/>
+            <a:r>
+              <a:rPr lang="en-US" sz="1800" dirty="0"/>
+              <a:t>For a time-intensive project, was the result multiple manuscripts? </a:t>
+            </a:r>
+          </a:p>
+          <a:p>
+            <a:r>
+              <a:rPr lang="en-US" sz="2000" dirty="0">
+                <a:solidFill>
+                  <a:schemeClr val="accent2"/>
+                </a:solidFill>
+              </a:rPr>
               <a:t>Determining when to cut your losses and when to pursue a project further</a:t>
             </a:r>
           </a:p>
           <a:p>
             <a:pPr lvl="1"/>
             <a:r>
-              <a:rPr lang="en-US" sz="2000" dirty="0"/>
+              <a:rPr lang="en-US" sz="1800" dirty="0"/>
               <a:t>“We’ve spent 200+ hours on this project and aren’t close to the deliverable. Is this even going to be feasible?”</a:t>
             </a:r>
           </a:p>
           <a:p>
             <a:pPr lvl="1"/>
             <a:r>
-              <a:rPr lang="en-US" sz="2000" dirty="0"/>
+              <a:rPr lang="en-US" sz="1800" dirty="0"/>
               <a:t>“We’ve spent 100 hours on work for this conference presentation, should we turn it into a manuscript?”</a:t>
             </a:r>
           </a:p>
           <a:p>
             <a:r>
-              <a:rPr lang="en-US" sz="2400" dirty="0">
+              <a:rPr lang="en-US" sz="2000" dirty="0">
                 <a:solidFill>
                   <a:schemeClr val="accent2"/>
                 </a:solidFill>
@@ -8382,14 +8382,14 @@
           <a:p>
             <a:pPr lvl="1"/>
             <a:r>
-              <a:rPr lang="en-US" sz="2000" dirty="0"/>
+              <a:rPr lang="en-US" sz="1800" dirty="0"/>
               <a:t>Useful metric for when re-analyses are requested</a:t>
             </a:r>
           </a:p>
           <a:p>
             <a:pPr lvl="1"/>
             <a:r>
-              <a:rPr lang="en-US" sz="2000" dirty="0"/>
+              <a:rPr lang="en-US" sz="1800" dirty="0"/>
               <a:t>“We’ve spent 20 hours on the analysis, please circulate the manuscript draft before we complete additional analyses.”</a:t>
             </a:r>
           </a:p>
@@ -8581,6 +8581,36 @@
           </a:p>
         </p:txBody>
       </p:sp>
+      <p:pic>
+        <p:nvPicPr>
+          <p:cNvPr id="4" name="Picture 3">
+            <a:extLst>
+              <a:ext uri="{FF2B5EF4-FFF2-40B4-BE49-F238E27FC236}">
+                <a16:creationId xmlns:a16="http://schemas.microsoft.com/office/drawing/2014/main" id="{7F3E11D5-5C8C-6F40-B4CA-524DC02B0349}"/>
+              </a:ext>
+            </a:extLst>
+          </p:cNvPr>
+          <p:cNvPicPr>
+            <a:picLocks noChangeAspect="1"/>
+          </p:cNvPicPr>
+          <p:nvPr/>
+        </p:nvPicPr>
+        <p:blipFill>
+          <a:blip r:embed="rId2"/>
+          <a:stretch>
+            <a:fillRect/>
+          </a:stretch>
+        </p:blipFill>
+        <p:spPr>
+          <a:xfrm>
+            <a:off x="1509939" y="1951535"/>
+            <a:ext cx="6191250" cy="4783044"/>
+          </a:xfrm>
+          <a:prstGeom prst="rect">
+            <a:avLst/>
+          </a:prstGeom>
+        </p:spPr>
+      </p:pic>
     </p:spTree>
     <p:extLst>
       <p:ext uri="{BB962C8B-B14F-4D97-AF65-F5344CB8AC3E}">
@@ -9013,8 +9043,21 @@
                   <a:schemeClr val="accent2"/>
                 </a:solidFill>
               </a:rPr>
-              <a:t>(Gantt chart)</a:t>
-            </a:r>
+              <a:t>(</a:t>
+            </a:r>
+            <a:r>
+              <a:rPr lang="en-US" sz="2400">
+                <a:solidFill>
+                  <a:schemeClr val="accent2"/>
+                </a:solidFill>
+              </a:rPr>
+              <a:t>project timeline)</a:t>
+            </a:r>
+            <a:endParaRPr lang="en-US" sz="2400" dirty="0">
+              <a:solidFill>
+                <a:schemeClr val="accent2"/>
+              </a:solidFill>
+            </a:endParaRPr>
           </a:p>
           <a:p>
             <a:endParaRPr lang="en-US" sz="2400" dirty="0"/>
@@ -13842,14 +13885,14 @@
           </a:ln>
           <a:extLst>
             <a:ext uri="{909E8E84-426E-40dd-AFC4-6F175D3DCCD1}">
-              <a14:hiddenFill xmlns:a14="http://schemas.microsoft.com/office/drawing/2010/main" xmlns="">
+              <a14:hiddenFill xmlns="" xmlns:a14="http://schemas.microsoft.com/office/drawing/2010/main">
                 <a:solidFill>
                   <a:srgbClr val="FFFFFF"/>
                 </a:solidFill>
               </a14:hiddenFill>
             </a:ext>
             <a:ext uri="{91240B29-F687-4f45-9708-019B960494DF}">
-              <a14:hiddenLine xmlns:a14="http://schemas.microsoft.com/office/drawing/2010/main" xmlns="" w="9525">
+              <a14:hiddenLine xmlns="" xmlns:a14="http://schemas.microsoft.com/office/drawing/2010/main" w="9525">
                 <a:solidFill>
                   <a:srgbClr val="000000"/>
                 </a:solidFill>
@@ -16908,15 +16951,6 @@
 </file>
 
 <file path=customXml/item2.xml><?xml version="1.0" encoding="utf-8"?>
-<?mso-contentType ?>
-<FormTemplates xmlns="http://schemas.microsoft.com/sharepoint/v3/contenttype/forms">
-  <Display>DocumentLibraryForm</Display>
-  <Edit>DocumentLibraryForm</Edit>
-  <New>DocumentLibraryForm</New>
-</FormTemplates>
-</file>
-
-<file path=customXml/item3.xml><?xml version="1.0" encoding="utf-8"?>
 <p:properties xmlns:p="http://schemas.microsoft.com/office/2006/metadata/properties" xmlns:xsi="http://www.w3.org/2001/XMLSchema-instance" xmlns:pc="http://schemas.microsoft.com/office/infopath/2007/PartnerControls">
   <documentManagement>
     <ImageCreateDate xmlns="E64CF27C-2ECC-48E8-947E-CA63274FB2E8" xsi:nil="true"/>
@@ -16925,6 +16959,15 @@
     <wic_System_Copyright xmlns="http://schemas.microsoft.com/sharepoint/v3/fields" xsi:nil="true"/>
   </documentManagement>
 </p:properties>
+</file>
+
+<file path=customXml/item3.xml><?xml version="1.0" encoding="utf-8"?>
+<?mso-contentType ?>
+<FormTemplates xmlns="http://schemas.microsoft.com/sharepoint/v3/contenttype/forms">
+  <Display>DocumentLibraryForm</Display>
+  <Edit>DocumentLibraryForm</Edit>
+  <New>DocumentLibraryForm</New>
+</FormTemplates>
 </file>
 
 <file path=customXml/itemProps1.xml><?xml version="1.0" encoding="utf-8"?>
@@ -16948,14 +16991,6 @@
 </file>
 
 <file path=customXml/itemProps2.xml><?xml version="1.0" encoding="utf-8"?>
-<ds:datastoreItem xmlns:ds="http://schemas.openxmlformats.org/officeDocument/2006/customXml" ds:itemID="{B01F69EB-AD96-4AD6-8A18-0C8728F5F031}">
-  <ds:schemaRefs>
-    <ds:schemaRef ds:uri="http://schemas.microsoft.com/sharepoint/v3/contenttype/forms"/>
-  </ds:schemaRefs>
-</ds:datastoreItem>
-</file>
-
-<file path=customXml/itemProps3.xml><?xml version="1.0" encoding="utf-8"?>
 <ds:datastoreItem xmlns:ds="http://schemas.openxmlformats.org/officeDocument/2006/customXml" ds:itemID="{2B30647F-A921-45DD-9E91-010F7EF4FB48}">
   <ds:schemaRefs>
     <ds:schemaRef ds:uri="http://schemas.microsoft.com/office/infopath/2007/PartnerControls"/>
@@ -16971,4 +17006,12 @@
     <ds:schemaRef ds:uri="http://purl.org/dc/dcmitype/"/>
   </ds:schemaRefs>
 </ds:datastoreItem>
+</file>
+
+<file path=customXml/itemProps3.xml><?xml version="1.0" encoding="utf-8"?>
+<ds:datastoreItem xmlns:ds="http://schemas.openxmlformats.org/officeDocument/2006/customXml" ds:itemID="{B01F69EB-AD96-4AD6-8A18-0C8728F5F031}">
+  <ds:schemaRefs>
+    <ds:schemaRef ds:uri="http://schemas.microsoft.com/sharepoint/v3/contenttype/forms"/>
+  </ds:schemaRefs>
+</ds:datastoreItem>
 </file>
</xml_diff>

<commit_message>
fix titles, minor tweeks to presentation
</commit_message>
<xml_diff>
--- a/RLadies timetrackR Presentation.pptx
+++ b/RLadies timetrackR Presentation.pptx
@@ -3445,7 +3445,7 @@
           <a:p>
             <a:fld id="{9C5C8B17-D1C9-48DD-A1B1-EDA1E362804A}" type="slidenum">
               <a:rPr lang="en-US" smtClean="0"/>
-              <a:t>23</a:t>
+              <a:t>20</a:t>
             </a:fld>
             <a:endParaRPr lang="en-US"/>
           </a:p>
@@ -3454,7 +3454,7 @@
     </p:spTree>
     <p:extLst>
       <p:ext uri="{BB962C8B-B14F-4D97-AF65-F5344CB8AC3E}">
-        <p14:creationId xmlns:p14="http://schemas.microsoft.com/office/powerpoint/2010/main" val="1526229412"/>
+        <p14:creationId xmlns:p14="http://schemas.microsoft.com/office/powerpoint/2010/main" val="1957396887"/>
       </p:ext>
     </p:extLst>
   </p:cSld>
@@ -3508,6 +3508,174 @@
           <a:bodyPr/>
           <a:lstStyle/>
           <a:p>
+            <a:endParaRPr lang="en-US" dirty="0"/>
+          </a:p>
+        </p:txBody>
+      </p:sp>
+      <p:sp>
+        <p:nvSpPr>
+          <p:cNvPr id="4" name="Slide Number Placeholder 3"/>
+          <p:cNvSpPr>
+            <a:spLocks noGrp="1"/>
+          </p:cNvSpPr>
+          <p:nvPr>
+            <p:ph type="sldNum" sz="quarter" idx="5"/>
+          </p:nvPr>
+        </p:nvSpPr>
+        <p:spPr/>
+        <p:txBody>
+          <a:bodyPr/>
+          <a:lstStyle/>
+          <a:p>
+            <a:fld id="{9C5C8B17-D1C9-48DD-A1B1-EDA1E362804A}" type="slidenum">
+              <a:rPr lang="en-US" smtClean="0"/>
+              <a:t>21</a:t>
+            </a:fld>
+            <a:endParaRPr lang="en-US"/>
+          </a:p>
+        </p:txBody>
+      </p:sp>
+    </p:spTree>
+    <p:extLst>
+      <p:ext uri="{BB962C8B-B14F-4D97-AF65-F5344CB8AC3E}">
+        <p14:creationId xmlns:p14="http://schemas.microsoft.com/office/powerpoint/2010/main" val="526878350"/>
+      </p:ext>
+    </p:extLst>
+  </p:cSld>
+  <p:clrMapOvr>
+    <a:masterClrMapping/>
+  </p:clrMapOvr>
+</p:notes>
+</file>
+
+<file path=ppt/notesSlides/notesSlide12.xml><?xml version="1.0" encoding="utf-8"?>
+<p:notes xmlns:a="http://schemas.openxmlformats.org/drawingml/2006/main" xmlns:r="http://schemas.openxmlformats.org/officeDocument/2006/relationships" xmlns:p="http://schemas.openxmlformats.org/presentationml/2006/main">
+  <p:cSld>
+    <p:spTree>
+      <p:nvGrpSpPr>
+        <p:cNvPr id="1" name=""/>
+        <p:cNvGrpSpPr/>
+        <p:nvPr/>
+      </p:nvGrpSpPr>
+      <p:grpSpPr>
+        <a:xfrm>
+          <a:off x="0" y="0"/>
+          <a:ext cx="0" cy="0"/>
+          <a:chOff x="0" y="0"/>
+          <a:chExt cx="0" cy="0"/>
+        </a:xfrm>
+      </p:grpSpPr>
+      <p:sp>
+        <p:nvSpPr>
+          <p:cNvPr id="2" name="Slide Image Placeholder 1"/>
+          <p:cNvSpPr>
+            <a:spLocks noGrp="1" noRot="1" noChangeAspect="1"/>
+          </p:cNvSpPr>
+          <p:nvPr>
+            <p:ph type="sldImg"/>
+          </p:nvPr>
+        </p:nvSpPr>
+        <p:spPr/>
+      </p:sp>
+      <p:sp>
+        <p:nvSpPr>
+          <p:cNvPr id="3" name="Notes Placeholder 2"/>
+          <p:cNvSpPr>
+            <a:spLocks noGrp="1"/>
+          </p:cNvSpPr>
+          <p:nvPr>
+            <p:ph type="body" idx="1"/>
+          </p:nvPr>
+        </p:nvSpPr>
+        <p:spPr/>
+        <p:txBody>
+          <a:bodyPr/>
+          <a:lstStyle/>
+          <a:p>
+            <a:endParaRPr lang="en-US" dirty="0"/>
+          </a:p>
+        </p:txBody>
+      </p:sp>
+      <p:sp>
+        <p:nvSpPr>
+          <p:cNvPr id="4" name="Slide Number Placeholder 3"/>
+          <p:cNvSpPr>
+            <a:spLocks noGrp="1"/>
+          </p:cNvSpPr>
+          <p:nvPr>
+            <p:ph type="sldNum" sz="quarter" idx="5"/>
+          </p:nvPr>
+        </p:nvSpPr>
+        <p:spPr/>
+        <p:txBody>
+          <a:bodyPr/>
+          <a:lstStyle/>
+          <a:p>
+            <a:fld id="{9C5C8B17-D1C9-48DD-A1B1-EDA1E362804A}" type="slidenum">
+              <a:rPr lang="en-US" smtClean="0"/>
+              <a:t>23</a:t>
+            </a:fld>
+            <a:endParaRPr lang="en-US"/>
+          </a:p>
+        </p:txBody>
+      </p:sp>
+    </p:spTree>
+    <p:extLst>
+      <p:ext uri="{BB962C8B-B14F-4D97-AF65-F5344CB8AC3E}">
+        <p14:creationId xmlns:p14="http://schemas.microsoft.com/office/powerpoint/2010/main" val="1526229412"/>
+      </p:ext>
+    </p:extLst>
+  </p:cSld>
+  <p:clrMapOvr>
+    <a:masterClrMapping/>
+  </p:clrMapOvr>
+</p:notes>
+</file>
+
+<file path=ppt/notesSlides/notesSlide13.xml><?xml version="1.0" encoding="utf-8"?>
+<p:notes xmlns:a="http://schemas.openxmlformats.org/drawingml/2006/main" xmlns:r="http://schemas.openxmlformats.org/officeDocument/2006/relationships" xmlns:p="http://schemas.openxmlformats.org/presentationml/2006/main">
+  <p:cSld>
+    <p:spTree>
+      <p:nvGrpSpPr>
+        <p:cNvPr id="1" name=""/>
+        <p:cNvGrpSpPr/>
+        <p:nvPr/>
+      </p:nvGrpSpPr>
+      <p:grpSpPr>
+        <a:xfrm>
+          <a:off x="0" y="0"/>
+          <a:ext cx="0" cy="0"/>
+          <a:chOff x="0" y="0"/>
+          <a:chExt cx="0" cy="0"/>
+        </a:xfrm>
+      </p:grpSpPr>
+      <p:sp>
+        <p:nvSpPr>
+          <p:cNvPr id="2" name="Slide Image Placeholder 1"/>
+          <p:cNvSpPr>
+            <a:spLocks noGrp="1" noRot="1" noChangeAspect="1"/>
+          </p:cNvSpPr>
+          <p:nvPr>
+            <p:ph type="sldImg"/>
+          </p:nvPr>
+        </p:nvSpPr>
+        <p:spPr/>
+      </p:sp>
+      <p:sp>
+        <p:nvSpPr>
+          <p:cNvPr id="3" name="Notes Placeholder 2"/>
+          <p:cNvSpPr>
+            <a:spLocks noGrp="1"/>
+          </p:cNvSpPr>
+          <p:nvPr>
+            <p:ph type="body" idx="1"/>
+          </p:nvPr>
+        </p:nvSpPr>
+        <p:spPr/>
+        <p:txBody>
+          <a:bodyPr/>
+          <a:lstStyle/>
+          <a:p>
             <a:r>
               <a:rPr lang="en-US" dirty="0">
                 <a:hlinkClick r:id="rId3"/>
@@ -3554,7 +3722,7 @@
 </p:notes>
 </file>
 
-<file path=ppt/notesSlides/notesSlide12.xml><?xml version="1.0" encoding="utf-8"?>
+<file path=ppt/notesSlides/notesSlide14.xml><?xml version="1.0" encoding="utf-8"?>
 <p:notes xmlns:a="http://schemas.openxmlformats.org/drawingml/2006/main" xmlns:r="http://schemas.openxmlformats.org/officeDocument/2006/relationships" xmlns:p="http://schemas.openxmlformats.org/presentationml/2006/main">
   <p:cSld>
     <p:spTree>
@@ -3872,16 +4040,7 @@
             </a:r>
           </a:p>
           <a:p>
-            <a:r>
-              <a:rPr lang="en-US" dirty="0"/>
-              <a:t>Some features like insights and saving reports are behind the paywall on Toggl</a:t>
-            </a:r>
-          </a:p>
-          <a:p>
-            <a:r>
-              <a:rPr lang="en-US" dirty="0"/>
-              <a:t>Wanted flexibility in terms of what was reported </a:t>
-            </a:r>
+            <a:endParaRPr lang="en-US" dirty="0"/>
           </a:p>
           <a:p>
             <a:r>
@@ -4397,7 +4556,7 @@
           <a:p>
             <a:fld id="{9C5C8B17-D1C9-48DD-A1B1-EDA1E362804A}" type="slidenum">
               <a:rPr lang="en-US" smtClean="0"/>
-              <a:t>21</a:t>
+              <a:t>18</a:t>
             </a:fld>
             <a:endParaRPr lang="en-US"/>
           </a:p>
@@ -4406,7 +4565,7 @@
     </p:spTree>
     <p:extLst>
       <p:ext uri="{BB962C8B-B14F-4D97-AF65-F5344CB8AC3E}">
-        <p14:creationId xmlns:p14="http://schemas.microsoft.com/office/powerpoint/2010/main" val="526878350"/>
+        <p14:creationId xmlns:p14="http://schemas.microsoft.com/office/powerpoint/2010/main" val="3552024904"/>
       </p:ext>
     </p:extLst>
   </p:cSld>
@@ -6732,17 +6891,17 @@
           </a:ln>
           <a:extLst>
             <a:ext uri="{FAA26D3D-D897-4be2-8F04-BA451C77F1D7}">
-              <ma14:placeholderFlag xmlns:ma14="http://schemas.microsoft.com/office/mac/drawingml/2011/main" xmlns="" val="1"/>
+              <ma14:placeholderFlag xmlns="" xmlns:ma14="http://schemas.microsoft.com/office/mac/drawingml/2011/main" val="1"/>
             </a:ext>
             <a:ext uri="{909E8E84-426E-40dd-AFC4-6F175D3DCCD1}">
-              <a14:hiddenFill xmlns:a14="http://schemas.microsoft.com/office/drawing/2010/main" xmlns="">
+              <a14:hiddenFill xmlns="" xmlns:a14="http://schemas.microsoft.com/office/drawing/2010/main">
                 <a:solidFill>
                   <a:srgbClr val="FFFFFF"/>
                 </a:solidFill>
               </a14:hiddenFill>
             </a:ext>
             <a:ext uri="{91240B29-F687-4f45-9708-019B960494DF}">
-              <a14:hiddenLine xmlns:a14="http://schemas.microsoft.com/office/drawing/2010/main" xmlns="" w="9525">
+              <a14:hiddenLine xmlns="" xmlns:a14="http://schemas.microsoft.com/office/drawing/2010/main" w="9525">
                 <a:solidFill>
                   <a:srgbClr val="000000"/>
                 </a:solidFill>
@@ -6794,17 +6953,17 @@
           </a:ln>
           <a:extLst>
             <a:ext uri="{FAA26D3D-D897-4be2-8F04-BA451C77F1D7}">
-              <ma14:placeholderFlag xmlns:ma14="http://schemas.microsoft.com/office/mac/drawingml/2011/main" xmlns="" val="1"/>
+              <ma14:placeholderFlag xmlns="" xmlns:ma14="http://schemas.microsoft.com/office/mac/drawingml/2011/main" val="1"/>
             </a:ext>
             <a:ext uri="{909E8E84-426E-40dd-AFC4-6F175D3DCCD1}">
-              <a14:hiddenFill xmlns:a14="http://schemas.microsoft.com/office/drawing/2010/main" xmlns="">
+              <a14:hiddenFill xmlns="" xmlns:a14="http://schemas.microsoft.com/office/drawing/2010/main">
                 <a:solidFill>
                   <a:srgbClr val="FFFFFF"/>
                 </a:solidFill>
               </a14:hiddenFill>
             </a:ext>
             <a:ext uri="{91240B29-F687-4f45-9708-019B960494DF}">
-              <a14:hiddenLine xmlns:a14="http://schemas.microsoft.com/office/drawing/2010/main" xmlns="" w="9525">
+              <a14:hiddenLine xmlns="" xmlns:a14="http://schemas.microsoft.com/office/drawing/2010/main" w="9525">
                 <a:solidFill>
                   <a:srgbClr val="000000"/>
                 </a:solidFill>
@@ -8581,36 +8740,6 @@
           </a:p>
         </p:txBody>
       </p:sp>
-      <p:pic>
-        <p:nvPicPr>
-          <p:cNvPr id="4" name="Picture 3">
-            <a:extLst>
-              <a:ext uri="{FF2B5EF4-FFF2-40B4-BE49-F238E27FC236}">
-                <a16:creationId xmlns:a16="http://schemas.microsoft.com/office/drawing/2014/main" id="{7F3E11D5-5C8C-6F40-B4CA-524DC02B0349}"/>
-              </a:ext>
-            </a:extLst>
-          </p:cNvPr>
-          <p:cNvPicPr>
-            <a:picLocks noChangeAspect="1"/>
-          </p:cNvPicPr>
-          <p:nvPr/>
-        </p:nvPicPr>
-        <p:blipFill>
-          <a:blip r:embed="rId2"/>
-          <a:stretch>
-            <a:fillRect/>
-          </a:stretch>
-        </p:blipFill>
-        <p:spPr>
-          <a:xfrm>
-            <a:off x="1509939" y="1951535"/>
-            <a:ext cx="6191250" cy="4783044"/>
-          </a:xfrm>
-          <a:prstGeom prst="rect">
-            <a:avLst/>
-          </a:prstGeom>
-        </p:spPr>
-      </p:pic>
     </p:spTree>
     <p:extLst>
       <p:ext uri="{BB962C8B-B14F-4D97-AF65-F5344CB8AC3E}">
@@ -9812,21 +9941,21 @@
             <a:pPr lvl="1"/>
             <a:r>
               <a:rPr lang="en-US" sz="2400" dirty="0"/>
-              <a:t>Includes a template Excel spreadsheet for logging your hours by task</a:t>
+              <a:t>Includes a template Excel spreadsheet for logging your hours</a:t>
             </a:r>
           </a:p>
           <a:p>
             <a:pPr lvl="1"/>
             <a:r>
               <a:rPr lang="en-US" sz="2400" dirty="0"/>
-              <a:t>Hours tracker is where you log your hours</a:t>
+              <a:t>Required: Hours tracker is where you log your hours</a:t>
             </a:r>
           </a:p>
           <a:p>
             <a:pPr lvl="1"/>
             <a:r>
               <a:rPr lang="en-US" sz="2400" dirty="0"/>
-              <a:t>Project tracker summarizes information like principal investigator (PI), deliverable, status, etc.</a:t>
+              <a:t>Optional: Project tracker summarizes information like principal investigator (PI), deliverable, status, etc.</a:t>
             </a:r>
           </a:p>
           <a:p>
@@ -13885,14 +14014,14 @@
           </a:ln>
           <a:extLst>
             <a:ext uri="{909E8E84-426E-40dd-AFC4-6F175D3DCCD1}">
-              <a14:hiddenFill xmlns="" xmlns:a14="http://schemas.microsoft.com/office/drawing/2010/main">
+              <a14:hiddenFill xmlns:a14="http://schemas.microsoft.com/office/drawing/2010/main" xmlns="">
                 <a:solidFill>
                   <a:srgbClr val="FFFFFF"/>
                 </a:solidFill>
               </a14:hiddenFill>
             </a:ext>
             <a:ext uri="{91240B29-F687-4f45-9708-019B960494DF}">
-              <a14:hiddenLine xmlns="" xmlns:a14="http://schemas.microsoft.com/office/drawing/2010/main" w="9525">
+              <a14:hiddenLine xmlns:a14="http://schemas.microsoft.com/office/drawing/2010/main" xmlns="" w="9525">
                 <a:solidFill>
                   <a:srgbClr val="000000"/>
                 </a:solidFill>
@@ -16749,6 +16878,26 @@
 </file>
 
 <file path=customXml/item1.xml><?xml version="1.0" encoding="utf-8"?>
+<?mso-contentType ?>
+<FormTemplates xmlns="http://schemas.microsoft.com/sharepoint/v3/contenttype/forms">
+  <Display>DocumentLibraryForm</Display>
+  <Edit>DocumentLibraryForm</Edit>
+  <New>DocumentLibraryForm</New>
+</FormTemplates>
+</file>
+
+<file path=customXml/item2.xml><?xml version="1.0" encoding="utf-8"?>
+<p:properties xmlns:p="http://schemas.microsoft.com/office/2006/metadata/properties" xmlns:xsi="http://www.w3.org/2001/XMLSchema-instance" xmlns:pc="http://schemas.microsoft.com/office/infopath/2007/PartnerControls">
+  <documentManagement>
+    <ImageCreateDate xmlns="E64CF27C-2ECC-48E8-947E-CA63274FB2E8" xsi:nil="true"/>
+    <PublishingExpirationDate xmlns="http://schemas.microsoft.com/sharepoint/v3" xsi:nil="true"/>
+    <PublishingStartDate xmlns="http://schemas.microsoft.com/sharepoint/v3" xsi:nil="true"/>
+    <wic_System_Copyright xmlns="http://schemas.microsoft.com/sharepoint/v3/fields" xsi:nil="true"/>
+  </documentManagement>
+</p:properties>
+</file>
+
+<file path=customXml/item3.xml><?xml version="1.0" encoding="utf-8"?>
 <ct:contentTypeSchema xmlns:ct="http://schemas.microsoft.com/office/2006/metadata/contentType" xmlns:ma="http://schemas.microsoft.com/office/2006/metadata/properties/metaAttributes" ct:_="" ma:_="" ma:contentTypeName="Image" ma:contentTypeID="0x0101009148F5A04DDD49CBA7127AADA5FB792B00AADE34325A8B49CDA8BB4DB53328F214008DA1A4150FB2B848A3EB7B452BFA7AC5" ma:contentTypeVersion="1" ma:contentTypeDescription="Upload an image." ma:contentTypeScope="" ma:versionID="c5dd4a19140d82efd42bf2e2156fee3e">
   <xsd:schema xmlns:xsd="http://www.w3.org/2001/XMLSchema" xmlns:xs="http://www.w3.org/2001/XMLSchema" xmlns:p="http://schemas.microsoft.com/office/2006/metadata/properties" xmlns:ns1="http://schemas.microsoft.com/sharepoint/v3" xmlns:ns2="E64CF27C-2ECC-48E8-947E-CA63274FB2E8" xmlns:ns3="http://schemas.microsoft.com/sharepoint/v3/fields" targetNamespace="http://schemas.microsoft.com/office/2006/metadata/properties" ma:root="true" ma:fieldsID="8669bc30feb5185623fa09da941496e2" ns1:_="" ns2:_="" ns3:_="">
     <xsd:import namespace="http://schemas.microsoft.com/sharepoint/v3"/>
@@ -16950,42 +17099,10 @@
 </ct:contentTypeSchema>
 </file>
 
-<file path=customXml/item2.xml><?xml version="1.0" encoding="utf-8"?>
-<p:properties xmlns:p="http://schemas.microsoft.com/office/2006/metadata/properties" xmlns:xsi="http://www.w3.org/2001/XMLSchema-instance" xmlns:pc="http://schemas.microsoft.com/office/infopath/2007/PartnerControls">
-  <documentManagement>
-    <ImageCreateDate xmlns="E64CF27C-2ECC-48E8-947E-CA63274FB2E8" xsi:nil="true"/>
-    <PublishingExpirationDate xmlns="http://schemas.microsoft.com/sharepoint/v3" xsi:nil="true"/>
-    <PublishingStartDate xmlns="http://schemas.microsoft.com/sharepoint/v3" xsi:nil="true"/>
-    <wic_System_Copyright xmlns="http://schemas.microsoft.com/sharepoint/v3/fields" xsi:nil="true"/>
-  </documentManagement>
-</p:properties>
-</file>
-
-<file path=customXml/item3.xml><?xml version="1.0" encoding="utf-8"?>
-<?mso-contentType ?>
-<FormTemplates xmlns="http://schemas.microsoft.com/sharepoint/v3/contenttype/forms">
-  <Display>DocumentLibraryForm</Display>
-  <Edit>DocumentLibraryForm</Edit>
-  <New>DocumentLibraryForm</New>
-</FormTemplates>
-</file>
-
 <file path=customXml/itemProps1.xml><?xml version="1.0" encoding="utf-8"?>
-<ds:datastoreItem xmlns:ds="http://schemas.openxmlformats.org/officeDocument/2006/customXml" ds:itemID="{E57EBD8B-EA50-4231-9F03-F9188E4066E3}">
+<ds:datastoreItem xmlns:ds="http://schemas.openxmlformats.org/officeDocument/2006/customXml" ds:itemID="{B01F69EB-AD96-4AD6-8A18-0C8728F5F031}">
   <ds:schemaRefs>
-    <ds:schemaRef ds:uri="http://schemas.microsoft.com/office/2006/metadata/contentType"/>
-    <ds:schemaRef ds:uri="http://schemas.microsoft.com/office/2006/metadata/properties/metaAttributes"/>
-    <ds:schemaRef ds:uri="http://www.w3.org/2001/XMLSchema"/>
-    <ds:schemaRef ds:uri="http://schemas.microsoft.com/office/2006/metadata/properties"/>
-    <ds:schemaRef ds:uri="http://schemas.microsoft.com/sharepoint/v3"/>
-    <ds:schemaRef ds:uri="E64CF27C-2ECC-48E8-947E-CA63274FB2E8"/>
-    <ds:schemaRef ds:uri="http://schemas.microsoft.com/sharepoint/v3/fields"/>
-    <ds:schemaRef ds:uri="http://schemas.microsoft.com/office/2006/documentManagement/types"/>
-    <ds:schemaRef ds:uri="http://schemas.microsoft.com/office/infopath/2007/PartnerControls"/>
-    <ds:schemaRef ds:uri="http://schemas.openxmlformats.org/package/2006/metadata/core-properties"/>
-    <ds:schemaRef ds:uri="http://purl.org/dc/elements/1.1/"/>
-    <ds:schemaRef ds:uri="http://purl.org/dc/terms/"/>
-    <ds:schemaRef ds:uri="http://schemas.microsoft.com/internal/obd"/>
+    <ds:schemaRef ds:uri="http://schemas.microsoft.com/sharepoint/v3/contenttype/forms"/>
   </ds:schemaRefs>
 </ds:datastoreItem>
 </file>
@@ -17009,9 +17126,21 @@
 </file>
 
 <file path=customXml/itemProps3.xml><?xml version="1.0" encoding="utf-8"?>
-<ds:datastoreItem xmlns:ds="http://schemas.openxmlformats.org/officeDocument/2006/customXml" ds:itemID="{B01F69EB-AD96-4AD6-8A18-0C8728F5F031}">
+<ds:datastoreItem xmlns:ds="http://schemas.openxmlformats.org/officeDocument/2006/customXml" ds:itemID="{E57EBD8B-EA50-4231-9F03-F9188E4066E3}">
   <ds:schemaRefs>
-    <ds:schemaRef ds:uri="http://schemas.microsoft.com/sharepoint/v3/contenttype/forms"/>
+    <ds:schemaRef ds:uri="http://schemas.microsoft.com/office/2006/metadata/contentType"/>
+    <ds:schemaRef ds:uri="http://schemas.microsoft.com/office/2006/metadata/properties/metaAttributes"/>
+    <ds:schemaRef ds:uri="http://www.w3.org/2001/XMLSchema"/>
+    <ds:schemaRef ds:uri="http://schemas.microsoft.com/office/2006/metadata/properties"/>
+    <ds:schemaRef ds:uri="http://schemas.microsoft.com/sharepoint/v3"/>
+    <ds:schemaRef ds:uri="E64CF27C-2ECC-48E8-947E-CA63274FB2E8"/>
+    <ds:schemaRef ds:uri="http://schemas.microsoft.com/sharepoint/v3/fields"/>
+    <ds:schemaRef ds:uri="http://schemas.microsoft.com/office/2006/documentManagement/types"/>
+    <ds:schemaRef ds:uri="http://schemas.microsoft.com/office/infopath/2007/PartnerControls"/>
+    <ds:schemaRef ds:uri="http://schemas.openxmlformats.org/package/2006/metadata/core-properties"/>
+    <ds:schemaRef ds:uri="http://purl.org/dc/elements/1.1/"/>
+    <ds:schemaRef ds:uri="http://purl.org/dc/terms/"/>
+    <ds:schemaRef ds:uri="http://schemas.microsoft.com/internal/obd"/>
   </ds:schemaRefs>
 </ds:datastoreItem>
 </file>
</xml_diff>